<commit_message>
Updated presentation and added some brainwaves for next dojo's
</commit_message>
<xml_diff>
--- a/warehouse/Coding Kata - TDD Extending the Warehouse.pptx
+++ b/warehouse/Coding Kata - TDD Extending the Warehouse.pptx
@@ -5,7 +5,7 @@
     <p:sldMasterId id="2147483648" r:id="rId1"/>
   </p:sldMasterIdLst>
   <p:notesMasterIdLst>
-    <p:notesMasterId r:id="rId19"/>
+    <p:notesMasterId r:id="rId18"/>
   </p:notesMasterIdLst>
   <p:sldIdLst>
     <p:sldId id="279" r:id="rId2"/>
@@ -22,9 +22,8 @@
     <p:sldId id="304" r:id="rId13"/>
     <p:sldId id="305" r:id="rId14"/>
     <p:sldId id="294" r:id="rId15"/>
-    <p:sldId id="297" r:id="rId16"/>
-    <p:sldId id="298" r:id="rId17"/>
-    <p:sldId id="299" r:id="rId18"/>
+    <p:sldId id="298" r:id="rId16"/>
+    <p:sldId id="299" r:id="rId17"/>
   </p:sldIdLst>
   <p:sldSz cx="9144000" cy="6858000" type="screen4x3"/>
   <p:notesSz cx="6858000" cy="9144000"/>
@@ -236,7 +235,7 @@
           <a:p>
             <a:fld id="{312D2A74-5733-489F-AE3E-678E3C4642CF}" type="datetimeFigureOut">
               <a:rPr lang="nl-NL" smtClean="0"/>
-              <a:t>14-4-2016</a:t>
+              <a:t>20-4-2016</a:t>
             </a:fld>
             <a:endParaRPr lang="nl-NL"/>
           </a:p>
@@ -502,6 +501,106 @@
     </a:lvl9pPr>
   </p:notesStyle>
 </p:notesMaster>
+</file>
+
+<file path=ppt/notesSlides/notesSlide1.xml><?xml version="1.0" encoding="utf-8"?>
+<p:notes xmlns:a="http://schemas.openxmlformats.org/drawingml/2006/main" xmlns:r="http://schemas.openxmlformats.org/officeDocument/2006/relationships" xmlns:p="http://schemas.openxmlformats.org/presentationml/2006/main">
+  <p:cSld>
+    <p:spTree>
+      <p:nvGrpSpPr>
+        <p:cNvPr id="1" name=""/>
+        <p:cNvGrpSpPr/>
+        <p:nvPr/>
+      </p:nvGrpSpPr>
+      <p:grpSpPr>
+        <a:xfrm>
+          <a:off x="0" y="0"/>
+          <a:ext cx="0" cy="0"/>
+          <a:chOff x="0" y="0"/>
+          <a:chExt cx="0" cy="0"/>
+        </a:xfrm>
+      </p:grpSpPr>
+      <p:sp>
+        <p:nvSpPr>
+          <p:cNvPr id="2" name="Slide Image Placeholder 1"/>
+          <p:cNvSpPr>
+            <a:spLocks noGrp="1" noRot="1" noChangeAspect="1"/>
+          </p:cNvSpPr>
+          <p:nvPr>
+            <p:ph type="sldImg"/>
+          </p:nvPr>
+        </p:nvSpPr>
+        <p:spPr/>
+      </p:sp>
+      <p:sp>
+        <p:nvSpPr>
+          <p:cNvPr id="3" name="Notes Placeholder 2"/>
+          <p:cNvSpPr>
+            <a:spLocks noGrp="1"/>
+          </p:cNvSpPr>
+          <p:nvPr>
+            <p:ph type="body" idx="1"/>
+          </p:nvPr>
+        </p:nvSpPr>
+        <p:spPr/>
+        <p:txBody>
+          <a:bodyPr/>
+          <a:lstStyle/>
+          <a:p>
+            <a:r>
+              <a:rPr lang="nl-NL" dirty="0" smtClean="0"/>
+              <a:t>Express klein font </a:t>
+            </a:r>
+            <a:r>
+              <a:rPr lang="nl-NL" dirty="0" smtClean="0">
+                <a:sym typeface="Wingdings" panose="05000000000000000000" pitchFamily="2" charset="2"/>
+              </a:rPr>
+              <a:t> uitdelen</a:t>
+            </a:r>
+            <a:r>
+              <a:rPr lang="nl-NL" baseline="0" dirty="0" smtClean="0">
+                <a:sym typeface="Wingdings" panose="05000000000000000000" pitchFamily="2" charset="2"/>
+              </a:rPr>
+              <a:t> met de Acceptatie Criteria erbij. Marco en ik zijn ‘PO’ van de opdracht.</a:t>
+            </a:r>
+            <a:endParaRPr lang="nl-NL" dirty="0"/>
+          </a:p>
+        </p:txBody>
+      </p:sp>
+      <p:sp>
+        <p:nvSpPr>
+          <p:cNvPr id="4" name="Slide Number Placeholder 3"/>
+          <p:cNvSpPr>
+            <a:spLocks noGrp="1"/>
+          </p:cNvSpPr>
+          <p:nvPr>
+            <p:ph type="sldNum" sz="quarter" idx="10"/>
+          </p:nvPr>
+        </p:nvSpPr>
+        <p:spPr/>
+        <p:txBody>
+          <a:bodyPr/>
+          <a:lstStyle/>
+          <a:p>
+            <a:fld id="{940CE284-30FB-4FF8-B9E6-6E562EA3B02E}" type="slidenum">
+              <a:rPr lang="nl-NL" smtClean="0"/>
+              <a:t>14</a:t>
+            </a:fld>
+            <a:endParaRPr lang="nl-NL"/>
+          </a:p>
+        </p:txBody>
+      </p:sp>
+    </p:spTree>
+    <p:extLst>
+      <p:ext uri="{BB962C8B-B14F-4D97-AF65-F5344CB8AC3E}">
+        <p14:creationId xmlns:p14="http://schemas.microsoft.com/office/powerpoint/2010/main" val="2945075288"/>
+      </p:ext>
+    </p:extLst>
+  </p:cSld>
+  <p:clrMapOvr>
+    <a:masterClrMapping/>
+  </p:clrMapOvr>
+</p:notes>
 </file>
 
 <file path=ppt/slideLayouts/slideLayout1.xml><?xml version="1.0" encoding="utf-8"?>
@@ -5494,16 +5593,7 @@
                 </a:solidFill>
                 <a:latin typeface="Bebas Neue" panose="020B0000000000000000" pitchFamily="34" charset="0"/>
               </a:rPr>
-              <a:t>: </a:t>
-            </a:r>
-            <a:r>
-              <a:rPr lang="nl-NL" sz="3600" dirty="0" smtClean="0">
-                <a:solidFill>
-                  <a:srgbClr val="00572D"/>
-                </a:solidFill>
-                <a:latin typeface="Bebas Neue" panose="020B0000000000000000" pitchFamily="34" charset="0"/>
-              </a:rPr>
-              <a:t>TDD – </a:t>
+              <a:t>: TDD – </a:t>
             </a:r>
             <a:r>
               <a:rPr lang="nl-NL" sz="3600" dirty="0" err="1" smtClean="0">
@@ -5541,12 +5631,6 @@
               </a:rPr>
               <a:t> warehouse</a:t>
             </a:r>
-            <a:endParaRPr lang="nl-NL" sz="3600" dirty="0" smtClean="0">
-              <a:solidFill>
-                <a:srgbClr val="00572D"/>
-              </a:solidFill>
-              <a:latin typeface="Bebas Neue" panose="020B0000000000000000" pitchFamily="34" charset="0"/>
-            </a:endParaRPr>
           </a:p>
           <a:p>
             <a:endParaRPr lang="nl-NL" sz="2000" dirty="0" smtClean="0"/>
@@ -5621,30 +5705,18 @@
           <a:lstStyle/>
           <a:p>
             <a:r>
-              <a:rPr lang="nl-NL" sz="2800" dirty="0" smtClean="0">
+              <a:rPr lang="nl-NL" sz="2800" dirty="0">
                 <a:latin typeface="Bebas Neue" panose="020B0000000000000000" pitchFamily="34" charset="0"/>
               </a:rPr>
-              <a:t>Test </a:t>
-            </a:r>
-            <a:r>
-              <a:rPr lang="nl-NL" sz="2800" dirty="0" err="1" smtClean="0">
+              <a:t>Pair </a:t>
+            </a:r>
+            <a:r>
+              <a:rPr lang="nl-NL" sz="2800" dirty="0" err="1">
                 <a:latin typeface="Bebas Neue" panose="020B0000000000000000" pitchFamily="34" charset="0"/>
               </a:rPr>
-              <a:t>driven</a:t>
-            </a:r>
-            <a:r>
-              <a:rPr lang="nl-NL" sz="2800" dirty="0" smtClean="0">
-                <a:latin typeface="Bebas Neue" panose="020B0000000000000000" pitchFamily="34" charset="0"/>
-              </a:rPr>
-              <a:t> </a:t>
-            </a:r>
-            <a:r>
-              <a:rPr lang="nl-NL" sz="2800" dirty="0" err="1" smtClean="0">
-                <a:latin typeface="Bebas Neue" panose="020B0000000000000000" pitchFamily="34" charset="0"/>
-              </a:rPr>
-              <a:t>development</a:t>
-            </a:r>
-            <a:endParaRPr lang="nl-NL" dirty="0">
+              <a:t>programming</a:t>
+            </a:r>
+            <a:endParaRPr lang="nl-NL" sz="2800" dirty="0">
               <a:latin typeface="Bebas Neue" panose="020B0000000000000000" pitchFamily="34" charset="0"/>
             </a:endParaRPr>
           </a:p>
@@ -5671,49 +5743,13 @@
           <a:lstStyle/>
           <a:p>
             <a:r>
-              <a:rPr lang="nl-NL" sz="2000" dirty="0" err="1" smtClean="0">
+              <a:rPr lang="nl-NL" sz="2000" dirty="0" smtClean="0">
                 <a:solidFill>
                   <a:srgbClr val="A5CD39"/>
                 </a:solidFill>
                 <a:latin typeface="Bebas Neue" panose="020B0000000000000000" pitchFamily="34" charset="0"/>
               </a:rPr>
-              <a:t>With</a:t>
-            </a:r>
-            <a:r>
-              <a:rPr lang="nl-NL" sz="2000" dirty="0" smtClean="0">
-                <a:solidFill>
-                  <a:srgbClr val="A5CD39"/>
-                </a:solidFill>
-                <a:latin typeface="Bebas Neue" panose="020B0000000000000000" pitchFamily="34" charset="0"/>
-              </a:rPr>
-              <a:t> pair </a:t>
-            </a:r>
-            <a:r>
-              <a:rPr lang="nl-NL" sz="2000" dirty="0" err="1" smtClean="0">
-                <a:solidFill>
-                  <a:srgbClr val="A5CD39"/>
-                </a:solidFill>
-                <a:latin typeface="Bebas Neue" panose="020B0000000000000000" pitchFamily="34" charset="0"/>
-              </a:rPr>
-              <a:t>programming</a:t>
-            </a:r>
-            <a:r>
-              <a:rPr lang="nl-NL" sz="2000" dirty="0" smtClean="0">
-                <a:solidFill>
-                  <a:srgbClr val="A5CD39"/>
-                </a:solidFill>
-                <a:latin typeface="Bebas Neue" panose="020B0000000000000000" pitchFamily="34" charset="0"/>
-              </a:rPr>
-              <a:t> - </a:t>
-            </a:r>
-            <a:r>
-              <a:rPr lang="nl-NL" sz="2000" dirty="0" err="1" smtClean="0">
-                <a:solidFill>
-                  <a:srgbClr val="A5CD39"/>
-                </a:solidFill>
-                <a:latin typeface="Bebas Neue" panose="020B0000000000000000" pitchFamily="34" charset="0"/>
-              </a:rPr>
-              <a:t>Guidelines</a:t>
+              <a:t>schematisch</a:t>
             </a:r>
             <a:endParaRPr lang="nl-NL" sz="2000" dirty="0">
               <a:solidFill>
@@ -5853,8 +5889,8 @@
         </p:blipFill>
         <p:spPr>
           <a:xfrm>
-            <a:off x="406499" y="1108702"/>
-            <a:ext cx="8191500" cy="5953125"/>
+            <a:off x="323528" y="548680"/>
+            <a:ext cx="8191500" cy="6192689"/>
           </a:xfrm>
           <a:prstGeom prst="rect">
             <a:avLst/>
@@ -5919,30 +5955,18 @@
           <a:lstStyle/>
           <a:p>
             <a:r>
-              <a:rPr lang="nl-NL" sz="2800" dirty="0" smtClean="0">
+              <a:rPr lang="nl-NL" sz="2800" dirty="0">
                 <a:latin typeface="Bebas Neue" panose="020B0000000000000000" pitchFamily="34" charset="0"/>
               </a:rPr>
-              <a:t>Test </a:t>
-            </a:r>
-            <a:r>
-              <a:rPr lang="nl-NL" sz="2800" dirty="0" err="1" smtClean="0">
+              <a:t>Pair </a:t>
+            </a:r>
+            <a:r>
+              <a:rPr lang="nl-NL" sz="2800" dirty="0" err="1">
                 <a:latin typeface="Bebas Neue" panose="020B0000000000000000" pitchFamily="34" charset="0"/>
               </a:rPr>
-              <a:t>driven</a:t>
-            </a:r>
-            <a:r>
-              <a:rPr lang="nl-NL" sz="2800" dirty="0" smtClean="0">
-                <a:latin typeface="Bebas Neue" panose="020B0000000000000000" pitchFamily="34" charset="0"/>
-              </a:rPr>
-              <a:t> </a:t>
-            </a:r>
-            <a:r>
-              <a:rPr lang="nl-NL" sz="2800" dirty="0" err="1" smtClean="0">
-                <a:latin typeface="Bebas Neue" panose="020B0000000000000000" pitchFamily="34" charset="0"/>
-              </a:rPr>
-              <a:t>development</a:t>
-            </a:r>
-            <a:endParaRPr lang="nl-NL" dirty="0">
+              <a:t>programming</a:t>
+            </a:r>
+            <a:endParaRPr lang="nl-NL" sz="2800" dirty="0">
               <a:latin typeface="Bebas Neue" panose="020B0000000000000000" pitchFamily="34" charset="0"/>
             </a:endParaRPr>
           </a:p>
@@ -5969,40 +5993,13 @@
           <a:lstStyle/>
           <a:p>
             <a:r>
-              <a:rPr lang="nl-NL" sz="2000" dirty="0" err="1" smtClean="0">
+              <a:rPr lang="nl-NL" sz="2000" dirty="0" smtClean="0">
                 <a:solidFill>
                   <a:srgbClr val="A5CD39"/>
                 </a:solidFill>
                 <a:latin typeface="Bebas Neue" panose="020B0000000000000000" pitchFamily="34" charset="0"/>
               </a:rPr>
-              <a:t>With</a:t>
-            </a:r>
-            <a:r>
-              <a:rPr lang="nl-NL" sz="2000" dirty="0" smtClean="0">
-                <a:solidFill>
-                  <a:srgbClr val="A5CD39"/>
-                </a:solidFill>
-                <a:latin typeface="Bebas Neue" panose="020B0000000000000000" pitchFamily="34" charset="0"/>
-              </a:rPr>
-              <a:t> pair </a:t>
-            </a:r>
-            <a:r>
-              <a:rPr lang="nl-NL" sz="2000" dirty="0" err="1" smtClean="0">
-                <a:solidFill>
-                  <a:srgbClr val="A5CD39"/>
-                </a:solidFill>
-                <a:latin typeface="Bebas Neue" panose="020B0000000000000000" pitchFamily="34" charset="0"/>
-              </a:rPr>
-              <a:t>programming</a:t>
-            </a:r>
-            <a:r>
-              <a:rPr lang="nl-NL" sz="2000" dirty="0" smtClean="0">
-                <a:solidFill>
-                  <a:srgbClr val="A5CD39"/>
-                </a:solidFill>
-                <a:latin typeface="Bebas Neue" panose="020B0000000000000000" pitchFamily="34" charset="0"/>
-              </a:rPr>
-              <a:t> - hoe</a:t>
+              <a:t>Hoe dan?</a:t>
             </a:r>
             <a:endParaRPr lang="nl-NL" sz="2000" dirty="0">
               <a:solidFill>
@@ -6039,9 +6036,22 @@
               </a:lnSpc>
               <a:buNone/>
             </a:pPr>
+            <a:endParaRPr lang="nl-NL" sz="2800" dirty="0" smtClean="0"/>
+          </a:p>
+          <a:p>
+            <a:pPr marL="0" indent="0">
+              <a:lnSpc>
+                <a:spcPct val="100000"/>
+              </a:lnSpc>
+              <a:buNone/>
+            </a:pPr>
             <a:r>
               <a:rPr lang="nl-NL" sz="2800" dirty="0" smtClean="0"/>
-              <a:t>Optie 1</a:t>
+              <a:t>Optie </a:t>
+            </a:r>
+            <a:r>
+              <a:rPr lang="nl-NL" sz="2800" dirty="0" smtClean="0"/>
+              <a:t>1</a:t>
             </a:r>
             <a:endParaRPr lang="nl-NL" sz="2800" dirty="0"/>
           </a:p>
@@ -6492,6 +6502,36 @@
           </a:prstGeom>
         </p:spPr>
       </p:pic>
+      <p:pic>
+        <p:nvPicPr>
+          <p:cNvPr id="2" name="Picture 1"/>
+          <p:cNvPicPr>
+            <a:picLocks noChangeAspect="1"/>
+          </p:cNvPicPr>
+          <p:nvPr/>
+        </p:nvPicPr>
+        <p:blipFill>
+          <a:blip r:embed="rId3">
+            <a:extLst>
+              <a:ext uri="{28A0092B-C50C-407E-A947-70E740481C1C}">
+                <a14:useLocalDpi xmlns:a14="http://schemas.microsoft.com/office/drawing/2010/main" val="0"/>
+              </a:ext>
+            </a:extLst>
+          </a:blip>
+          <a:stretch>
+            <a:fillRect/>
+          </a:stretch>
+        </p:blipFill>
+        <p:spPr>
+          <a:xfrm>
+            <a:off x="755576" y="1986365"/>
+            <a:ext cx="3600400" cy="3784362"/>
+          </a:xfrm>
+          <a:prstGeom prst="rect">
+            <a:avLst/>
+          </a:prstGeom>
+        </p:spPr>
+      </p:pic>
     </p:spTree>
     <p:extLst>
       <p:ext uri="{BB962C8B-B14F-4D97-AF65-F5344CB8AC3E}">
@@ -6708,48 +6748,6 @@
           </a:p>
         </p:txBody>
       </p:sp>
-      <p:sp>
-        <p:nvSpPr>
-          <p:cNvPr id="9" name="Curved Left Arrow 8"/>
-          <p:cNvSpPr/>
-          <p:nvPr/>
-        </p:nvSpPr>
-        <p:spPr>
-          <a:xfrm flipV="1">
-            <a:off x="6660232" y="2276872"/>
-            <a:ext cx="731520" cy="1800200"/>
-          </a:xfrm>
-          <a:prstGeom prst="curvedLeftArrow">
-            <a:avLst/>
-          </a:prstGeom>
-        </p:spPr>
-        <p:style>
-          <a:lnRef idx="1">
-            <a:schemeClr val="accent1"/>
-          </a:lnRef>
-          <a:fillRef idx="3">
-            <a:schemeClr val="accent1"/>
-          </a:fillRef>
-          <a:effectRef idx="2">
-            <a:schemeClr val="accent1"/>
-          </a:effectRef>
-          <a:fontRef idx="minor">
-            <a:schemeClr val="lt1"/>
-          </a:fontRef>
-        </p:style>
-        <p:txBody>
-          <a:bodyPr rtlCol="0" anchor="ctr"/>
-          <a:lstStyle/>
-          <a:p>
-            <a:pPr algn="ctr"/>
-            <a:endParaRPr lang="nl-NL">
-              <a:solidFill>
-                <a:schemeClr val="tx1"/>
-              </a:solidFill>
-            </a:endParaRPr>
-          </a:p>
-        </p:txBody>
-      </p:sp>
       <p:pic>
         <p:nvPicPr>
           <p:cNvPr id="2" name="Picture 1"/>
@@ -6793,7 +6791,83 @@
   <p:timing>
     <p:tnLst>
       <p:par>
-        <p:cTn id="1" dur="indefinite" restart="never" nodeType="tmRoot"/>
+        <p:cTn id="1" dur="indefinite" restart="never" nodeType="tmRoot">
+          <p:childTnLst>
+            <p:seq concurrent="1" nextAc="seek">
+              <p:cTn id="2" dur="indefinite" nodeType="mainSeq">
+                <p:childTnLst>
+                  <p:par>
+                    <p:cTn id="3" fill="hold">
+                      <p:stCondLst>
+                        <p:cond delay="indefinite"/>
+                      </p:stCondLst>
+                      <p:childTnLst>
+                        <p:par>
+                          <p:cTn id="4" fill="hold">
+                            <p:stCondLst>
+                              <p:cond delay="0"/>
+                            </p:stCondLst>
+                            <p:childTnLst>
+                              <p:par>
+                                <p:cTn id="5" presetID="10" presetClass="entr" presetSubtype="0" fill="hold" nodeType="clickEffect">
+                                  <p:stCondLst>
+                                    <p:cond delay="0"/>
+                                  </p:stCondLst>
+                                  <p:childTnLst>
+                                    <p:set>
+                                      <p:cBhvr>
+                                        <p:cTn id="6" dur="1" fill="hold">
+                                          <p:stCondLst>
+                                            <p:cond delay="0"/>
+                                          </p:stCondLst>
+                                        </p:cTn>
+                                        <p:tgtEl>
+                                          <p:spTgt spid="2"/>
+                                        </p:tgtEl>
+                                        <p:attrNameLst>
+                                          <p:attrName>style.visibility</p:attrName>
+                                        </p:attrNameLst>
+                                      </p:cBhvr>
+                                      <p:to>
+                                        <p:strVal val="visible"/>
+                                      </p:to>
+                                    </p:set>
+                                    <p:animEffect transition="in" filter="fade">
+                                      <p:cBhvr>
+                                        <p:cTn id="7" dur="500"/>
+                                        <p:tgtEl>
+                                          <p:spTgt spid="2"/>
+                                        </p:tgtEl>
+                                      </p:cBhvr>
+                                    </p:animEffect>
+                                  </p:childTnLst>
+                                </p:cTn>
+                              </p:par>
+                            </p:childTnLst>
+                          </p:cTn>
+                        </p:par>
+                      </p:childTnLst>
+                    </p:cTn>
+                  </p:par>
+                </p:childTnLst>
+              </p:cTn>
+              <p:prevCondLst>
+                <p:cond evt="onPrev" delay="0">
+                  <p:tgtEl>
+                    <p:sldTgt/>
+                  </p:tgtEl>
+                </p:cond>
+              </p:prevCondLst>
+              <p:nextCondLst>
+                <p:cond evt="onNext" delay="0">
+                  <p:tgtEl>
+                    <p:sldTgt/>
+                  </p:tgtEl>
+                </p:cond>
+              </p:nextCondLst>
+            </p:seq>
+          </p:childTnLst>
+        </p:cTn>
       </p:par>
     </p:tnLst>
   </p:timing>
@@ -6841,7 +6915,13 @@
               <a:rPr lang="nl-NL" sz="2800" dirty="0" smtClean="0">
                 <a:latin typeface="Bebas Neue" panose="020B0000000000000000" pitchFamily="34" charset="0"/>
               </a:rPr>
-              <a:t>De User story</a:t>
+              <a:t>De </a:t>
+            </a:r>
+            <a:r>
+              <a:rPr lang="nl-NL" sz="2800" dirty="0" err="1" smtClean="0">
+                <a:latin typeface="Bebas Neue" panose="020B0000000000000000" pitchFamily="34" charset="0"/>
+              </a:rPr>
+              <a:t>kata</a:t>
             </a:r>
             <a:endParaRPr lang="nl-NL" dirty="0">
               <a:latin typeface="Bebas Neue" panose="020B0000000000000000" pitchFamily="34" charset="0"/>
@@ -6876,7 +6956,16 @@
                 </a:solidFill>
                 <a:latin typeface="Bebas Neue" panose="020B0000000000000000" pitchFamily="34" charset="0"/>
               </a:rPr>
-              <a:t>Romeinse getallen</a:t>
+              <a:t>User </a:t>
+            </a:r>
+            <a:r>
+              <a:rPr lang="nl-NL" sz="2000" dirty="0" err="1" smtClean="0">
+                <a:solidFill>
+                  <a:srgbClr val="A5CD39"/>
+                </a:solidFill>
+                <a:latin typeface="Bebas Neue" panose="020B0000000000000000" pitchFamily="34" charset="0"/>
+              </a:rPr>
+              <a:t>stories</a:t>
             </a:r>
             <a:endParaRPr lang="nl-NL" sz="2000" dirty="0">
               <a:solidFill>
@@ -6899,7 +6988,7 @@
         </p:nvSpPr>
         <p:spPr>
           <a:xfrm>
-            <a:off x="755576" y="1268760"/>
+            <a:off x="755576" y="1370787"/>
             <a:ext cx="7858447" cy="4896544"/>
           </a:xfrm>
         </p:spPr>
@@ -6907,246 +6996,213 @@
           <a:bodyPr/>
           <a:lstStyle/>
           <a:p>
-            <a:pPr marL="0" indent="0">
-              <a:lnSpc>
-                <a:spcPct val="100000"/>
-              </a:lnSpc>
-              <a:buNone/>
-            </a:pPr>
-            <a:r>
-              <a:rPr lang="nl-NL" sz="2400" dirty="0" smtClean="0"/>
-              <a:t>User story:</a:t>
-            </a:r>
-          </a:p>
-          <a:p>
-            <a:pPr marL="0" indent="0">
-              <a:lnSpc>
-                <a:spcPct val="100000"/>
-              </a:lnSpc>
-              <a:buNone/>
-            </a:pPr>
-            <a:r>
-              <a:rPr lang="nl-NL" sz="2000" dirty="0" smtClean="0"/>
-              <a:t>Als marketing manager, wil ik een mogelijkheid om getallen te kunnen converteren naar een Romeinse notatie, zodat ik de release datum van de </a:t>
-            </a:r>
-            <a:r>
-              <a:rPr lang="nl-NL" sz="2000" dirty="0" err="1" smtClean="0"/>
-              <a:t>app</a:t>
-            </a:r>
-            <a:r>
-              <a:rPr lang="nl-NL" sz="2000" dirty="0" smtClean="0"/>
-              <a:t> kan tonen in Romeinse notatie.</a:t>
-            </a:r>
-          </a:p>
-          <a:p>
-            <a:pPr marL="0" indent="0">
-              <a:lnSpc>
-                <a:spcPct val="100000"/>
-              </a:lnSpc>
-              <a:buNone/>
-            </a:pPr>
-            <a:endParaRPr lang="nl-NL" sz="2000" dirty="0" smtClean="0"/>
-          </a:p>
-          <a:p>
-            <a:pPr marL="0" indent="0">
-              <a:lnSpc>
-                <a:spcPct val="100000"/>
-              </a:lnSpc>
-              <a:buNone/>
-            </a:pPr>
-            <a:r>
-              <a:rPr lang="nl-NL" sz="2400" dirty="0" smtClean="0"/>
-              <a:t>Bijvoorbeeld: </a:t>
-            </a:r>
-            <a:r>
-              <a:rPr lang="nl-NL" sz="2000" dirty="0" smtClean="0">
-                <a:solidFill>
-                  <a:srgbClr val="A5CD39"/>
-                </a:solidFill>
-              </a:rPr>
-              <a:t>2016 </a:t>
-            </a:r>
-            <a:r>
-              <a:rPr lang="nl-NL" sz="2000" dirty="0" smtClean="0">
-                <a:solidFill>
-                  <a:srgbClr val="A5CD39"/>
-                </a:solidFill>
-                <a:sym typeface="Wingdings" panose="05000000000000000000" pitchFamily="2" charset="2"/>
-              </a:rPr>
-              <a:t></a:t>
-            </a:r>
-            <a:r>
-              <a:rPr lang="nl-NL" sz="2000" dirty="0">
-                <a:solidFill>
-                  <a:srgbClr val="A5CD39"/>
-                </a:solidFill>
-              </a:rPr>
-              <a:t> </a:t>
-            </a:r>
-            <a:r>
-              <a:rPr lang="nl-NL" sz="2000" dirty="0" smtClean="0">
-                <a:solidFill>
-                  <a:srgbClr val="A5CD39"/>
-                </a:solidFill>
-              </a:rPr>
-              <a:t>MMXVI</a:t>
-            </a:r>
-            <a:r>
-              <a:rPr lang="nl-NL" sz="2000" dirty="0" smtClean="0"/>
-              <a:t> en </a:t>
-            </a:r>
-            <a:r>
-              <a:rPr lang="nl-NL" sz="2000" dirty="0">
-                <a:solidFill>
-                  <a:srgbClr val="A5CD39"/>
-                </a:solidFill>
-                <a:sym typeface="Wingdings" panose="05000000000000000000" pitchFamily="2" charset="2"/>
-              </a:rPr>
-              <a:t>1989 </a:t>
-            </a:r>
-            <a:r>
-              <a:rPr lang="nl-NL" sz="2000" dirty="0" smtClean="0">
-                <a:solidFill>
-                  <a:srgbClr val="A5CD39"/>
-                </a:solidFill>
-                <a:sym typeface="Wingdings" panose="05000000000000000000" pitchFamily="2" charset="2"/>
-              </a:rPr>
-              <a:t></a:t>
-            </a:r>
-            <a:r>
-              <a:rPr lang="nl-NL" sz="2000" dirty="0">
-                <a:solidFill>
-                  <a:srgbClr val="A5CD39"/>
-                </a:solidFill>
-              </a:rPr>
-              <a:t> MCMLXXXIX </a:t>
-            </a:r>
-            <a:endParaRPr lang="nl-NL" sz="2000" dirty="0" smtClean="0">
-              <a:solidFill>
-                <a:srgbClr val="A5CD39"/>
-              </a:solidFill>
-            </a:endParaRPr>
-          </a:p>
-          <a:p>
-            <a:pPr marL="0" indent="0">
-              <a:lnSpc>
-                <a:spcPct val="100000"/>
-              </a:lnSpc>
-              <a:buNone/>
-            </a:pPr>
-            <a:endParaRPr lang="nl-NL" sz="2400" dirty="0" smtClean="0"/>
-          </a:p>
-          <a:p>
-            <a:pPr marL="0" indent="0">
-              <a:lnSpc>
-                <a:spcPct val="100000"/>
-              </a:lnSpc>
-              <a:buNone/>
-            </a:pPr>
-            <a:r>
-              <a:rPr lang="nl-NL" sz="2400" dirty="0" smtClean="0"/>
-              <a:t>Acceptatie criteria:</a:t>
-            </a:r>
-          </a:p>
-          <a:p>
-            <a:pPr>
-              <a:lnSpc>
-                <a:spcPct val="100000"/>
-              </a:lnSpc>
-            </a:pPr>
-            <a:r>
-              <a:rPr lang="nl-NL" sz="2000" dirty="0" smtClean="0"/>
-              <a:t>Getallen tot en met 3000 kunnen worden geconverteerd</a:t>
-            </a:r>
-          </a:p>
-          <a:p>
-            <a:pPr>
-              <a:lnSpc>
-                <a:spcPct val="100000"/>
-              </a:lnSpc>
-            </a:pPr>
-            <a:r>
-              <a:rPr lang="nl-NL" sz="2000" dirty="0" smtClean="0"/>
-              <a:t>Alleen positieve en gehele getallen worden geconverteerd</a:t>
-            </a:r>
-          </a:p>
-          <a:p>
-            <a:pPr marL="0" indent="0">
-              <a:lnSpc>
-                <a:spcPct val="100000"/>
-              </a:lnSpc>
-              <a:buNone/>
-            </a:pPr>
-            <a:endParaRPr lang="nl-NL" sz="2400" dirty="0" smtClean="0"/>
-          </a:p>
-          <a:p>
-            <a:pPr marL="0" indent="0">
-              <a:lnSpc>
-                <a:spcPct val="100000"/>
-              </a:lnSpc>
-              <a:buNone/>
-            </a:pPr>
-            <a:r>
-              <a:rPr lang="nl-NL" sz="2400" dirty="0" smtClean="0"/>
-              <a:t>Info: </a:t>
-            </a:r>
-            <a:r>
-              <a:rPr lang="nl-NL" sz="2400" dirty="0">
-                <a:hlinkClick r:id="rId2"/>
-              </a:rPr>
-              <a:t>www.novaroma.org/via_romana/numbers.html</a:t>
-            </a:r>
-            <a:endParaRPr lang="nl-NL" sz="2400" dirty="0"/>
-          </a:p>
-          <a:p>
-            <a:pPr marL="0" indent="0">
-              <a:lnSpc>
-                <a:spcPct val="100000"/>
-              </a:lnSpc>
-              <a:buNone/>
-            </a:pPr>
-            <a:endParaRPr lang="nl-NL" sz="2400" dirty="0" smtClean="0"/>
-          </a:p>
-          <a:p>
-            <a:pPr marL="0" indent="0">
-              <a:lnSpc>
-                <a:spcPct val="100000"/>
-              </a:lnSpc>
-              <a:buNone/>
-            </a:pPr>
-            <a:endParaRPr lang="nl-NL" sz="2400" dirty="0" smtClean="0"/>
-          </a:p>
-          <a:p>
-            <a:pPr>
-              <a:lnSpc>
-                <a:spcPct val="100000"/>
-              </a:lnSpc>
-            </a:pPr>
-            <a:endParaRPr lang="nl-NL" sz="2400" dirty="0" smtClean="0"/>
-          </a:p>
-          <a:p>
-            <a:pPr>
-              <a:lnSpc>
-                <a:spcPct val="100000"/>
-              </a:lnSpc>
-            </a:pPr>
-            <a:endParaRPr lang="nl-NL" sz="2000" dirty="0"/>
-          </a:p>
-          <a:p>
-            <a:pPr>
-              <a:lnSpc>
-                <a:spcPct val="100000"/>
-              </a:lnSpc>
-            </a:pPr>
-            <a:endParaRPr lang="nl-NL" sz="2000" dirty="0"/>
-          </a:p>
-          <a:p>
-            <a:pPr>
-              <a:lnSpc>
-                <a:spcPct val="100000"/>
-              </a:lnSpc>
-            </a:pPr>
-            <a:endParaRPr lang="nl-NL" sz="1600" dirty="0" smtClean="0"/>
+            <a:pPr>
+              <a:lnSpc>
+                <a:spcPct val="100000"/>
+              </a:lnSpc>
+              <a:buFont typeface="+mj-lt"/>
+              <a:buAutoNum type="arabicPeriod"/>
+            </a:pPr>
+            <a:r>
+              <a:rPr lang="nl-NL" sz="1400" dirty="0"/>
+              <a:t>Als voorraadbeheerder wil ik aan kunnen geven dat er een maximaal gewicht van producten op een plank (</a:t>
+            </a:r>
+            <a:r>
+              <a:rPr lang="nl-NL" sz="1400" dirty="0" err="1"/>
+              <a:t>Shelf</a:t>
+            </a:r>
+            <a:r>
+              <a:rPr lang="nl-NL" sz="1400" dirty="0"/>
+              <a:t>) kunnen liggen, zodat de planken niet overbelast raken.</a:t>
+            </a:r>
+          </a:p>
+          <a:p>
+            <a:pPr>
+              <a:lnSpc>
+                <a:spcPct val="100000"/>
+              </a:lnSpc>
+              <a:buFont typeface="+mj-lt"/>
+              <a:buAutoNum type="arabicPeriod"/>
+            </a:pPr>
+            <a:endParaRPr lang="nl-NL" sz="1400" dirty="0"/>
+          </a:p>
+          <a:p>
+            <a:pPr>
+              <a:lnSpc>
+                <a:spcPct val="100000"/>
+              </a:lnSpc>
+              <a:buFont typeface="+mj-lt"/>
+              <a:buAutoNum type="arabicPeriod"/>
+            </a:pPr>
+            <a:r>
+              <a:rPr lang="nl-NL" sz="1400" dirty="0"/>
+              <a:t>Als voorraadbeheerder wil ik aan kunnen geven dat er een maximaal gewicht van producten op een rek (Rack) kunnen liggen, zodat de rekken niet overbelast raken.</a:t>
+            </a:r>
+          </a:p>
+          <a:p>
+            <a:pPr>
+              <a:lnSpc>
+                <a:spcPct val="100000"/>
+              </a:lnSpc>
+              <a:buFont typeface="+mj-lt"/>
+              <a:buAutoNum type="arabicPeriod"/>
+            </a:pPr>
+            <a:endParaRPr lang="nl-NL" sz="1400" dirty="0"/>
+          </a:p>
+          <a:p>
+            <a:pPr>
+              <a:lnSpc>
+                <a:spcPct val="100000"/>
+              </a:lnSpc>
+              <a:buFont typeface="+mj-lt"/>
+              <a:buAutoNum type="arabicPeriod"/>
+            </a:pPr>
+            <a:r>
+              <a:rPr lang="nl-NL" sz="1400" dirty="0"/>
+              <a:t>Als voorraadbeheerder wil ik dat op een plank er maar 1 product mag liggen, zodat producten geen effect op elkaar hebben.</a:t>
+            </a:r>
+          </a:p>
+          <a:p>
+            <a:pPr>
+              <a:lnSpc>
+                <a:spcPct val="100000"/>
+              </a:lnSpc>
+              <a:buFont typeface="+mj-lt"/>
+              <a:buAutoNum type="arabicPeriod"/>
+            </a:pPr>
+            <a:endParaRPr lang="nl-NL" sz="1400" dirty="0"/>
+          </a:p>
+          <a:p>
+            <a:pPr>
+              <a:lnSpc>
+                <a:spcPct val="100000"/>
+              </a:lnSpc>
+              <a:buFont typeface="+mj-lt"/>
+              <a:buAutoNum type="arabicPeriod"/>
+            </a:pPr>
+            <a:r>
+              <a:rPr lang="nl-NL" sz="1400" dirty="0"/>
+              <a:t>Als voorraadbeheerder wil ik kunnen aangeven dat er wel 2 non-food producten op een plank mogen liggen, omdat dat ruimte kan besparen in het warehouse.</a:t>
+            </a:r>
+          </a:p>
+          <a:p>
+            <a:pPr>
+              <a:lnSpc>
+                <a:spcPct val="100000"/>
+              </a:lnSpc>
+              <a:buFont typeface="+mj-lt"/>
+              <a:buAutoNum type="arabicPeriod"/>
+            </a:pPr>
+            <a:endParaRPr lang="nl-NL" sz="1400" dirty="0"/>
+          </a:p>
+          <a:p>
+            <a:pPr>
+              <a:lnSpc>
+                <a:spcPct val="100000"/>
+              </a:lnSpc>
+              <a:buFont typeface="+mj-lt"/>
+              <a:buAutoNum type="arabicPeriod"/>
+            </a:pPr>
+            <a:r>
+              <a:rPr lang="nl-NL" sz="1400" dirty="0"/>
+              <a:t>Als voorraadbeheerder wil ik kunnen aangeven dat wanneer de Airco aan is, er wel meerdere food producten op een plank mogen liggen, omdat het dan koel genoeg is.</a:t>
+            </a:r>
+          </a:p>
+          <a:p>
+            <a:pPr>
+              <a:lnSpc>
+                <a:spcPct val="100000"/>
+              </a:lnSpc>
+              <a:buFont typeface="+mj-lt"/>
+              <a:buAutoNum type="arabicPeriod"/>
+            </a:pPr>
+            <a:endParaRPr lang="nl-NL" sz="1400" dirty="0"/>
+          </a:p>
+          <a:p>
+            <a:pPr>
+              <a:lnSpc>
+                <a:spcPct val="100000"/>
+              </a:lnSpc>
+              <a:buFont typeface="+mj-lt"/>
+              <a:buAutoNum type="arabicPeriod"/>
+            </a:pPr>
+            <a:r>
+              <a:rPr lang="nl-NL" sz="1400" dirty="0"/>
+              <a:t>Als voorraadbeheerder wil ik kunnen aangeven dat een gebouw alleen food, non-food of beide mag bevatten, omdat ik dan een betere scheiding heb in welk gebouw ik zaken opsla.</a:t>
+            </a:r>
+          </a:p>
+          <a:p>
+            <a:pPr>
+              <a:lnSpc>
+                <a:spcPct val="100000"/>
+              </a:lnSpc>
+              <a:buFont typeface="+mj-lt"/>
+              <a:buAutoNum type="arabicPeriod"/>
+            </a:pPr>
+            <a:endParaRPr lang="nl-NL" sz="1400" dirty="0"/>
+          </a:p>
+          <a:p>
+            <a:pPr>
+              <a:lnSpc>
+                <a:spcPct val="100000"/>
+              </a:lnSpc>
+              <a:buFont typeface="+mj-lt"/>
+              <a:buAutoNum type="arabicPeriod"/>
+            </a:pPr>
+            <a:r>
+              <a:rPr lang="nl-NL" sz="1400" dirty="0"/>
+              <a:t>Als voorraadbeheerder wil ik in gevallen waarbij het systeem weigert producten op de plank te leggen, alternatieve planken zien in het zelfde gebouw.</a:t>
+            </a:r>
+          </a:p>
+          <a:p>
+            <a:pPr>
+              <a:lnSpc>
+                <a:spcPct val="100000"/>
+              </a:lnSpc>
+              <a:buFont typeface="+mj-lt"/>
+              <a:buAutoNum type="arabicPeriod"/>
+            </a:pPr>
+            <a:endParaRPr lang="nl-NL" sz="1400" dirty="0" smtClean="0"/>
+          </a:p>
+          <a:p>
+            <a:pPr>
+              <a:lnSpc>
+                <a:spcPct val="100000"/>
+              </a:lnSpc>
+              <a:buFont typeface="+mj-lt"/>
+              <a:buAutoNum type="arabicPeriod"/>
+            </a:pPr>
+            <a:endParaRPr lang="nl-NL" sz="1400" dirty="0" smtClean="0"/>
+          </a:p>
+          <a:p>
+            <a:pPr>
+              <a:lnSpc>
+                <a:spcPct val="100000"/>
+              </a:lnSpc>
+              <a:buFont typeface="+mj-lt"/>
+              <a:buAutoNum type="arabicPeriod"/>
+            </a:pPr>
+            <a:endParaRPr lang="nl-NL" sz="1200" dirty="0"/>
+          </a:p>
+          <a:p>
+            <a:pPr>
+              <a:lnSpc>
+                <a:spcPct val="100000"/>
+              </a:lnSpc>
+              <a:buFont typeface="+mj-lt"/>
+              <a:buAutoNum type="arabicPeriod"/>
+            </a:pPr>
+            <a:endParaRPr lang="nl-NL" sz="1200" dirty="0"/>
+          </a:p>
+          <a:p>
+            <a:pPr>
+              <a:lnSpc>
+                <a:spcPct val="100000"/>
+              </a:lnSpc>
+              <a:buFont typeface="+mj-lt"/>
+              <a:buAutoNum type="arabicPeriod"/>
+            </a:pPr>
+            <a:endParaRPr lang="nl-NL" sz="1050" dirty="0" smtClean="0"/>
           </a:p>
         </p:txBody>
       </p:sp>
@@ -7211,7 +7267,7 @@
               <a:rPr lang="nl-NL" sz="2800" dirty="0" smtClean="0">
                 <a:latin typeface="Bebas Neue" panose="020B0000000000000000" pitchFamily="34" charset="0"/>
               </a:rPr>
-              <a:t>De User story - extra</a:t>
+              <a:t>Presentaties en feedback</a:t>
             </a:r>
             <a:endParaRPr lang="nl-NL" dirty="0">
               <a:latin typeface="Bebas Neue" panose="020B0000000000000000" pitchFamily="34" charset="0"/>
@@ -7246,7 +7302,7 @@
                 </a:solidFill>
                 <a:latin typeface="Bebas Neue" panose="020B0000000000000000" pitchFamily="34" charset="0"/>
               </a:rPr>
-              <a:t>Romeinse getallen</a:t>
+              <a:t>Demo time</a:t>
             </a:r>
             <a:endParaRPr lang="nl-NL" sz="2000" dirty="0">
               <a:solidFill>
@@ -7283,170 +7339,6 @@
               </a:lnSpc>
               <a:buNone/>
             </a:pPr>
-            <a:r>
-              <a:rPr lang="nl-NL" sz="2400" dirty="0" smtClean="0"/>
-              <a:t>User story:</a:t>
-            </a:r>
-          </a:p>
-          <a:p>
-            <a:pPr marL="0" indent="0">
-              <a:lnSpc>
-                <a:spcPct val="100000"/>
-              </a:lnSpc>
-              <a:buNone/>
-            </a:pPr>
-            <a:r>
-              <a:rPr lang="nl-NL" sz="2000" dirty="0" smtClean="0"/>
-              <a:t>Als data beheerder, wil ik een mogelijkheid om Romeinse getallen te kunnen converteren naar een gewoon getal, zodat ik Romeinse notaties in externe invoer kan converteren naar iets zinnigs.</a:t>
-            </a:r>
-          </a:p>
-          <a:p>
-            <a:pPr marL="0" indent="0">
-              <a:lnSpc>
-                <a:spcPct val="100000"/>
-              </a:lnSpc>
-              <a:buNone/>
-            </a:pPr>
-            <a:endParaRPr lang="nl-NL" sz="2000" dirty="0" smtClean="0"/>
-          </a:p>
-          <a:p>
-            <a:pPr marL="0" indent="0">
-              <a:lnSpc>
-                <a:spcPct val="100000"/>
-              </a:lnSpc>
-              <a:buNone/>
-            </a:pPr>
-            <a:r>
-              <a:rPr lang="nl-NL" sz="2400" dirty="0" smtClean="0"/>
-              <a:t>Bijvoorbeeld: </a:t>
-            </a:r>
-            <a:r>
-              <a:rPr lang="nl-NL" sz="2000" dirty="0">
-                <a:solidFill>
-                  <a:srgbClr val="A5CD39"/>
-                </a:solidFill>
-              </a:rPr>
-              <a:t>MMXVI </a:t>
-            </a:r>
-            <a:r>
-              <a:rPr lang="nl-NL" sz="2000" dirty="0" smtClean="0">
-                <a:solidFill>
-                  <a:srgbClr val="A5CD39"/>
-                </a:solidFill>
-                <a:sym typeface="Wingdings" panose="05000000000000000000" pitchFamily="2" charset="2"/>
-              </a:rPr>
-              <a:t></a:t>
-            </a:r>
-            <a:r>
-              <a:rPr lang="nl-NL" sz="2000" dirty="0">
-                <a:solidFill>
-                  <a:srgbClr val="A5CD39"/>
-                </a:solidFill>
-              </a:rPr>
-              <a:t> 2016 </a:t>
-            </a:r>
-            <a:r>
-              <a:rPr lang="nl-NL" sz="2000" dirty="0"/>
-              <a:t>en </a:t>
-            </a:r>
-            <a:r>
-              <a:rPr lang="nl-NL" sz="2000" dirty="0" smtClean="0">
-                <a:solidFill>
-                  <a:srgbClr val="A5CD39"/>
-                </a:solidFill>
-              </a:rPr>
-              <a:t>MCMLXXXIX </a:t>
-            </a:r>
-            <a:r>
-              <a:rPr lang="nl-NL" sz="2000" dirty="0" smtClean="0">
-                <a:solidFill>
-                  <a:srgbClr val="A5CD39"/>
-                </a:solidFill>
-                <a:sym typeface="Wingdings" panose="05000000000000000000" pitchFamily="2" charset="2"/>
-              </a:rPr>
-              <a:t> 1989</a:t>
-            </a:r>
-            <a:endParaRPr lang="nl-NL" sz="2000" dirty="0" smtClean="0">
-              <a:solidFill>
-                <a:srgbClr val="A5CD39"/>
-              </a:solidFill>
-            </a:endParaRPr>
-          </a:p>
-          <a:p>
-            <a:pPr marL="0" indent="0">
-              <a:lnSpc>
-                <a:spcPct val="100000"/>
-              </a:lnSpc>
-              <a:buNone/>
-            </a:pPr>
-            <a:endParaRPr lang="nl-NL" sz="2400" dirty="0" smtClean="0"/>
-          </a:p>
-          <a:p>
-            <a:pPr marL="0" indent="0">
-              <a:lnSpc>
-                <a:spcPct val="100000"/>
-              </a:lnSpc>
-              <a:buNone/>
-            </a:pPr>
-            <a:r>
-              <a:rPr lang="nl-NL" sz="2400" dirty="0" smtClean="0"/>
-              <a:t>Acceptatie criteria:</a:t>
-            </a:r>
-          </a:p>
-          <a:p>
-            <a:pPr>
-              <a:lnSpc>
-                <a:spcPct val="100000"/>
-              </a:lnSpc>
-            </a:pPr>
-            <a:r>
-              <a:rPr lang="nl-NL" sz="2000" dirty="0" smtClean="0"/>
-              <a:t>Alleen geldige notaties kunnen </a:t>
-            </a:r>
-            <a:r>
-              <a:rPr lang="nl-NL" sz="2000" dirty="0"/>
-              <a:t>worden </a:t>
-            </a:r>
-            <a:r>
-              <a:rPr lang="nl-NL" sz="2000" dirty="0" smtClean="0"/>
-              <a:t>geconverteerd, anders een melding dat dat niet kan</a:t>
-            </a:r>
-          </a:p>
-          <a:p>
-            <a:pPr marL="0" indent="0">
-              <a:lnSpc>
-                <a:spcPct val="100000"/>
-              </a:lnSpc>
-              <a:buNone/>
-            </a:pPr>
-            <a:endParaRPr lang="nl-NL" sz="2400" dirty="0" smtClean="0"/>
-          </a:p>
-          <a:p>
-            <a:pPr marL="0" indent="0">
-              <a:lnSpc>
-                <a:spcPct val="100000"/>
-              </a:lnSpc>
-              <a:buNone/>
-            </a:pPr>
-            <a:r>
-              <a:rPr lang="nl-NL" sz="2400" dirty="0" smtClean="0"/>
-              <a:t>Info: </a:t>
-            </a:r>
-            <a:r>
-              <a:rPr lang="nl-NL" sz="2400" dirty="0">
-                <a:hlinkClick r:id="rId2"/>
-              </a:rPr>
-              <a:t>www.novaroma.org/via_romana/numbers.html</a:t>
-            </a:r>
-            <a:endParaRPr lang="nl-NL" sz="2400" dirty="0"/>
-          </a:p>
-          <a:p>
-            <a:pPr marL="0" indent="0">
-              <a:lnSpc>
-                <a:spcPct val="100000"/>
-              </a:lnSpc>
-              <a:buNone/>
-            </a:pPr>
             <a:endParaRPr lang="nl-NL" sz="2400" dirty="0" smtClean="0"/>
           </a:p>
           <a:p>
@@ -7492,184 +7384,36 @@
           </a:p>
         </p:txBody>
       </p:sp>
-    </p:spTree>
-    <p:extLst>
-      <p:ext uri="{BB962C8B-B14F-4D97-AF65-F5344CB8AC3E}">
-        <p14:creationId xmlns:p14="http://schemas.microsoft.com/office/powerpoint/2010/main" val="831412535"/>
-      </p:ext>
-    </p:extLst>
-  </p:cSld>
-  <p:clrMapOvr>
-    <a:masterClrMapping/>
-  </p:clrMapOvr>
-  <p:timing>
-    <p:tnLst>
-      <p:par>
-        <p:cTn id="1" dur="indefinite" restart="never" nodeType="tmRoot"/>
-      </p:par>
-    </p:tnLst>
-  </p:timing>
-</p:sld>
-</file>
-
-<file path=ppt/slides/slide16.xml><?xml version="1.0" encoding="utf-8"?>
-<p:sld xmlns:a="http://schemas.openxmlformats.org/drawingml/2006/main" xmlns:r="http://schemas.openxmlformats.org/officeDocument/2006/relationships" xmlns:p="http://schemas.openxmlformats.org/presentationml/2006/main">
-  <p:cSld>
-    <p:spTree>
-      <p:nvGrpSpPr>
-        <p:cNvPr id="1" name=""/>
-        <p:cNvGrpSpPr/>
-        <p:nvPr/>
-      </p:nvGrpSpPr>
-      <p:grpSpPr>
-        <a:xfrm>
-          <a:off x="0" y="0"/>
-          <a:ext cx="0" cy="0"/>
-          <a:chOff x="0" y="0"/>
-          <a:chExt cx="0" cy="0"/>
-        </a:xfrm>
-      </p:grpSpPr>
-      <p:sp>
-        <p:nvSpPr>
-          <p:cNvPr id="33" name="Text Placeholder 3"/>
-          <p:cNvSpPr>
-            <a:spLocks noGrp="1"/>
-          </p:cNvSpPr>
-          <p:nvPr>
-            <p:ph type="body" sz="quarter" idx="13"/>
-          </p:nvPr>
-        </p:nvSpPr>
-        <p:spPr>
-          <a:xfrm>
-            <a:off x="962025" y="548680"/>
-            <a:ext cx="6516688" cy="424900"/>
-          </a:xfrm>
-        </p:spPr>
-        <p:txBody>
-          <a:bodyPr/>
-          <a:lstStyle/>
-          <a:p>
-            <a:r>
-              <a:rPr lang="nl-NL" sz="2800" dirty="0" smtClean="0">
-                <a:latin typeface="Bebas Neue" panose="020B0000000000000000" pitchFamily="34" charset="0"/>
-              </a:rPr>
-              <a:t>Presentaties en feedback</a:t>
-            </a:r>
-            <a:endParaRPr lang="nl-NL" dirty="0">
-              <a:latin typeface="Bebas Neue" panose="020B0000000000000000" pitchFamily="34" charset="0"/>
-            </a:endParaRPr>
-          </a:p>
-        </p:txBody>
-      </p:sp>
-      <p:sp>
-        <p:nvSpPr>
-          <p:cNvPr id="34" name="Text Placeholder 3"/>
-          <p:cNvSpPr>
-            <a:spLocks noGrp="1"/>
-          </p:cNvSpPr>
-          <p:nvPr>
-            <p:ph type="body" sz="quarter" idx="13"/>
-          </p:nvPr>
-        </p:nvSpPr>
-        <p:spPr>
-          <a:xfrm>
-            <a:off x="962025" y="945887"/>
-            <a:ext cx="6516688" cy="353233"/>
-          </a:xfrm>
-        </p:spPr>
-        <p:txBody>
-          <a:bodyPr/>
-          <a:lstStyle/>
-          <a:p>
-            <a:r>
-              <a:rPr lang="nl-NL" sz="2000" dirty="0" smtClean="0">
-                <a:solidFill>
-                  <a:srgbClr val="A5CD39"/>
-                </a:solidFill>
-                <a:latin typeface="Bebas Neue" panose="020B0000000000000000" pitchFamily="34" charset="0"/>
-              </a:rPr>
-              <a:t>Demo time</a:t>
-            </a:r>
-            <a:endParaRPr lang="nl-NL" sz="2000" dirty="0">
-              <a:solidFill>
-                <a:srgbClr val="A5CD39"/>
-              </a:solidFill>
-              <a:latin typeface="Bebas Neue" panose="020B0000000000000000" pitchFamily="34" charset="0"/>
-            </a:endParaRPr>
-          </a:p>
-        </p:txBody>
-      </p:sp>
-      <p:sp>
-        <p:nvSpPr>
-          <p:cNvPr id="6" name="Text Placeholder 2"/>
-          <p:cNvSpPr>
-            <a:spLocks noGrp="1"/>
-          </p:cNvSpPr>
-          <p:nvPr>
-            <p:ph type="body" sz="quarter" idx="12"/>
-          </p:nvPr>
-        </p:nvSpPr>
-        <p:spPr>
-          <a:xfrm>
-            <a:off x="755576" y="1268760"/>
-            <a:ext cx="7858447" cy="4896544"/>
-          </a:xfrm>
-        </p:spPr>
-        <p:txBody>
-          <a:bodyPr/>
-          <a:lstStyle/>
-          <a:p>
-            <a:pPr marL="0" indent="0">
-              <a:lnSpc>
-                <a:spcPct val="100000"/>
-              </a:lnSpc>
-              <a:buNone/>
-            </a:pPr>
-            <a:endParaRPr lang="nl-NL" sz="2400" dirty="0" smtClean="0"/>
-          </a:p>
-          <a:p>
-            <a:pPr marL="0" indent="0">
-              <a:lnSpc>
-                <a:spcPct val="100000"/>
-              </a:lnSpc>
-              <a:buNone/>
-            </a:pPr>
-            <a:endParaRPr lang="nl-NL" sz="2400" dirty="0" smtClean="0"/>
-          </a:p>
-          <a:p>
-            <a:pPr>
-              <a:lnSpc>
-                <a:spcPct val="100000"/>
-              </a:lnSpc>
-            </a:pPr>
-            <a:endParaRPr lang="nl-NL" sz="2400" dirty="0" smtClean="0"/>
-          </a:p>
-          <a:p>
-            <a:pPr>
-              <a:lnSpc>
-                <a:spcPct val="100000"/>
-              </a:lnSpc>
-            </a:pPr>
-            <a:endParaRPr lang="nl-NL" sz="2000" dirty="0"/>
-          </a:p>
-          <a:p>
-            <a:pPr>
-              <a:lnSpc>
-                <a:spcPct val="100000"/>
-              </a:lnSpc>
-            </a:pPr>
-            <a:endParaRPr lang="nl-NL" sz="2000" dirty="0"/>
-          </a:p>
-          <a:p>
-            <a:pPr>
-              <a:lnSpc>
-                <a:spcPct val="100000"/>
-              </a:lnSpc>
-            </a:pPr>
-            <a:endParaRPr lang="nl-NL" sz="1600" dirty="0" smtClean="0"/>
-          </a:p>
-        </p:txBody>
-      </p:sp>
+      <p:pic>
+        <p:nvPicPr>
+          <p:cNvPr id="2" name="Picture 1"/>
+          <p:cNvPicPr>
+            <a:picLocks noChangeAspect="1"/>
+          </p:cNvPicPr>
+          <p:nvPr/>
+        </p:nvPicPr>
+        <p:blipFill>
+          <a:blip r:embed="rId2">
+            <a:extLst>
+              <a:ext uri="{28A0092B-C50C-407E-A947-70E740481C1C}">
+                <a14:useLocalDpi xmlns:a14="http://schemas.microsoft.com/office/drawing/2010/main" val="0"/>
+              </a:ext>
+            </a:extLst>
+          </a:blip>
+          <a:stretch>
+            <a:fillRect/>
+          </a:stretch>
+        </p:blipFill>
+        <p:spPr>
+          <a:xfrm>
+            <a:off x="1907704" y="986936"/>
+            <a:ext cx="4968552" cy="5537576"/>
+          </a:xfrm>
+          <a:prstGeom prst="rect">
+            <a:avLst/>
+          </a:prstGeom>
+        </p:spPr>
+      </p:pic>
     </p:spTree>
     <p:extLst>
       <p:ext uri="{BB962C8B-B14F-4D97-AF65-F5344CB8AC3E}">
@@ -7690,7 +7434,7 @@
 </p:sld>
 </file>
 
-<file path=ppt/slides/slide17.xml><?xml version="1.0" encoding="utf-8"?>
+<file path=ppt/slides/slide16.xml><?xml version="1.0" encoding="utf-8"?>
 <p:sld xmlns:a="http://schemas.openxmlformats.org/drawingml/2006/main" xmlns:r="http://schemas.openxmlformats.org/officeDocument/2006/relationships" xmlns:p="http://schemas.openxmlformats.org/presentationml/2006/main">
   <p:cSld>
     <p:spTree>
@@ -8089,13 +7833,7 @@
               <a:rPr lang="nl-NL" sz="2800" dirty="0" smtClean="0">
                 <a:latin typeface="Bebas Neue" panose="020B0000000000000000" pitchFamily="34" charset="0"/>
               </a:rPr>
-              <a:t>TDD </a:t>
-            </a:r>
-            <a:r>
-              <a:rPr lang="nl-NL" sz="2800" dirty="0" smtClean="0">
-                <a:latin typeface="Bebas Neue" panose="020B0000000000000000" pitchFamily="34" charset="0"/>
-              </a:rPr>
-              <a:t>– </a:t>
+              <a:t>TDD – </a:t>
             </a:r>
             <a:r>
               <a:rPr lang="nl-NL" sz="2800" dirty="0" err="1" smtClean="0">
@@ -8198,17 +7936,13 @@
                 <a:spcPct val="100000"/>
               </a:lnSpc>
             </a:pPr>
-            <a:endParaRPr lang="nl-NL" sz="2800" dirty="0" smtClean="0"/>
-          </a:p>
-          <a:p>
-            <a:pPr>
-              <a:lnSpc>
-                <a:spcPct val="100000"/>
-              </a:lnSpc>
-            </a:pPr>
             <a:r>
               <a:rPr lang="nl-NL" sz="2800" dirty="0" smtClean="0"/>
-              <a:t>R# - hints en tips </a:t>
+              <a:t>R</a:t>
+            </a:r>
+            <a:r>
+              <a:rPr lang="nl-NL" sz="2800" dirty="0" smtClean="0"/>
+              <a:t># - hints en tips </a:t>
             </a:r>
             <a:r>
               <a:rPr lang="nl-NL" sz="2800" dirty="0">
@@ -8244,7 +7978,15 @@
             </a:pPr>
             <a:r>
               <a:rPr lang="nl-NL" sz="2800" dirty="0" smtClean="0"/>
-              <a:t>Info en user story </a:t>
+              <a:t>Test </a:t>
+            </a:r>
+            <a:r>
+              <a:rPr lang="nl-NL" sz="2800" dirty="0" err="1" smtClean="0"/>
+              <a:t>Driven</a:t>
+            </a:r>
+            <a:r>
+              <a:rPr lang="nl-NL" sz="2800" dirty="0" smtClean="0"/>
+              <a:t> Development </a:t>
             </a:r>
             <a:r>
               <a:rPr lang="nl-NL" sz="2800" dirty="0">
@@ -8254,16 +7996,16 @@
                   </a:schemeClr>
                 </a:solidFill>
               </a:rPr>
-              <a:t>(20 minuten)</a:t>
-            </a:r>
-          </a:p>
-          <a:p>
-            <a:pPr>
-              <a:lnSpc>
-                <a:spcPct val="100000"/>
-              </a:lnSpc>
-            </a:pPr>
-            <a:endParaRPr lang="nl-NL" sz="2800" dirty="0"/>
+              <a:t>(5 minuten)</a:t>
+            </a:r>
+          </a:p>
+          <a:p>
+            <a:pPr>
+              <a:lnSpc>
+                <a:spcPct val="100000"/>
+              </a:lnSpc>
+            </a:pPr>
+            <a:endParaRPr lang="nl-NL" sz="2800" dirty="0" smtClean="0"/>
           </a:p>
           <a:p>
             <a:pPr>
@@ -8273,7 +8015,7 @@
             </a:pPr>
             <a:r>
               <a:rPr lang="nl-NL" sz="2800" dirty="0" smtClean="0"/>
-              <a:t>Coderen </a:t>
+              <a:t>Pair Programming </a:t>
             </a:r>
             <a:r>
               <a:rPr lang="nl-NL" sz="2800" dirty="0">
@@ -8283,7 +8025,30 @@
                   </a:schemeClr>
                 </a:solidFill>
               </a:rPr>
-              <a:t>(60 minuten</a:t>
+              <a:t>(5 minuten)</a:t>
+            </a:r>
+          </a:p>
+          <a:p>
+            <a:pPr>
+              <a:lnSpc>
+                <a:spcPct val="100000"/>
+              </a:lnSpc>
+            </a:pPr>
+            <a:endParaRPr lang="nl-NL" sz="2800" dirty="0" smtClean="0"/>
+          </a:p>
+          <a:p>
+            <a:pPr>
+              <a:lnSpc>
+                <a:spcPct val="100000"/>
+              </a:lnSpc>
+            </a:pPr>
+            <a:r>
+              <a:rPr lang="nl-NL" sz="2800" dirty="0" err="1" smtClean="0"/>
+              <a:t>Kata</a:t>
+            </a:r>
+            <a:r>
+              <a:rPr lang="nl-NL" sz="2800" dirty="0" smtClean="0"/>
+              <a:t> </a:t>
             </a:r>
             <a:r>
               <a:rPr lang="nl-NL" sz="2800" dirty="0" smtClean="0">
@@ -8293,28 +8058,17 @@
                   </a:schemeClr>
                 </a:solidFill>
               </a:rPr>
-              <a:t>)</a:t>
-            </a:r>
-            <a:br>
-              <a:rPr lang="nl-NL" sz="2800" dirty="0" smtClean="0">
+              <a:t>(75 </a:t>
+            </a:r>
+            <a:r>
+              <a:rPr lang="nl-NL" sz="2800" dirty="0">
                 <a:solidFill>
                   <a:schemeClr val="bg1">
                     <a:lumMod val="65000"/>
                   </a:schemeClr>
                 </a:solidFill>
               </a:rPr>
-            </a:br>
-            <a:endParaRPr lang="nl-NL" sz="2800" dirty="0"/>
-          </a:p>
-          <a:p>
-            <a:pPr>
-              <a:lnSpc>
-                <a:spcPct val="100000"/>
-              </a:lnSpc>
-            </a:pPr>
-            <a:r>
-              <a:rPr lang="nl-NL" sz="2800" dirty="0" smtClean="0"/>
-              <a:t>Presentatie en feedback </a:t>
+              <a:t>minuten</a:t>
             </a:r>
             <a:r>
               <a:rPr lang="nl-NL" sz="2800" dirty="0" smtClean="0">
@@ -8324,7 +8078,48 @@
                   </a:schemeClr>
                 </a:solidFill>
               </a:rPr>
-              <a:t>(30 </a:t>
+              <a:t>)</a:t>
+            </a:r>
+            <a:br>
+              <a:rPr lang="nl-NL" sz="2800" dirty="0" smtClean="0">
+                <a:solidFill>
+                  <a:schemeClr val="bg1">
+                    <a:lumMod val="65000"/>
+                  </a:schemeClr>
+                </a:solidFill>
+              </a:rPr>
+            </a:br>
+            <a:endParaRPr lang="nl-NL" sz="2800" dirty="0"/>
+          </a:p>
+          <a:p>
+            <a:pPr>
+              <a:lnSpc>
+                <a:spcPct val="100000"/>
+              </a:lnSpc>
+            </a:pPr>
+            <a:r>
+              <a:rPr lang="nl-NL" sz="2800" dirty="0" smtClean="0"/>
+              <a:t>Presentatie en feedback </a:t>
+            </a:r>
+            <a:r>
+              <a:rPr lang="nl-NL" sz="2800" dirty="0" smtClean="0">
+                <a:solidFill>
+                  <a:schemeClr val="bg1">
+                    <a:lumMod val="65000"/>
+                  </a:schemeClr>
+                </a:solidFill>
+              </a:rPr>
+              <a:t>(</a:t>
+            </a:r>
+            <a:r>
+              <a:rPr lang="nl-NL" sz="2800" dirty="0" smtClean="0">
+                <a:solidFill>
+                  <a:schemeClr val="bg1">
+                    <a:lumMod val="65000"/>
+                  </a:schemeClr>
+                </a:solidFill>
+              </a:rPr>
+              <a:t>35 </a:t>
             </a:r>
             <a:r>
               <a:rPr lang="nl-NL" sz="2800" dirty="0">
@@ -8425,7 +8220,7 @@
                                         <p:tgtEl>
                                           <p:spTgt spid="6">
                                             <p:txEl>
-                                              <p:pRg st="3" end="3"/>
+                                              <p:pRg st="0" end="0"/>
                                             </p:txEl>
                                           </p:spTgt>
                                         </p:tgtEl>
@@ -8443,7 +8238,7 @@
                                         <p:tgtEl>
                                           <p:spTgt spid="6">
                                             <p:txEl>
-                                              <p:pRg st="3" end="3"/>
+                                              <p:pRg st="0" end="0"/>
                                             </p:txEl>
                                           </p:spTgt>
                                         </p:tgtEl>
@@ -8486,7 +8281,7 @@
                                         <p:tgtEl>
                                           <p:spTgt spid="6">
                                             <p:txEl>
-                                              <p:pRg st="1" end="1"/>
+                                              <p:pRg st="2" end="2"/>
                                             </p:txEl>
                                           </p:spTgt>
                                         </p:tgtEl>
@@ -8504,7 +8299,7 @@
                                         <p:tgtEl>
                                           <p:spTgt spid="6">
                                             <p:txEl>
-                                              <p:pRg st="1" end="1"/>
+                                              <p:pRg st="2" end="2"/>
                                             </p:txEl>
                                           </p:spTgt>
                                         </p:tgtEl>
@@ -8547,7 +8342,7 @@
                                         <p:tgtEl>
                                           <p:spTgt spid="6">
                                             <p:txEl>
-                                              <p:pRg st="5" end="5"/>
+                                              <p:pRg st="4" end="4"/>
                                             </p:txEl>
                                           </p:spTgt>
                                         </p:tgtEl>
@@ -8565,7 +8360,7 @@
                                         <p:tgtEl>
                                           <p:spTgt spid="6">
                                             <p:txEl>
-                                              <p:pRg st="5" end="5"/>
+                                              <p:pRg st="4" end="4"/>
                                             </p:txEl>
                                           </p:spTgt>
                                         </p:tgtEl>
@@ -8641,6 +8436,67 @@
                       </p:childTnLst>
                     </p:cTn>
                   </p:par>
+                  <p:par>
+                    <p:cTn id="23" fill="hold">
+                      <p:stCondLst>
+                        <p:cond delay="indefinite"/>
+                      </p:stCondLst>
+                      <p:childTnLst>
+                        <p:par>
+                          <p:cTn id="24" fill="hold">
+                            <p:stCondLst>
+                              <p:cond delay="0"/>
+                            </p:stCondLst>
+                            <p:childTnLst>
+                              <p:par>
+                                <p:cTn id="25" presetID="10" presetClass="entr" presetSubtype="0" fill="hold" nodeType="clickEffect">
+                                  <p:stCondLst>
+                                    <p:cond delay="0"/>
+                                  </p:stCondLst>
+                                  <p:childTnLst>
+                                    <p:set>
+                                      <p:cBhvr>
+                                        <p:cTn id="26" dur="1" fill="hold">
+                                          <p:stCondLst>
+                                            <p:cond delay="0"/>
+                                          </p:stCondLst>
+                                        </p:cTn>
+                                        <p:tgtEl>
+                                          <p:spTgt spid="6">
+                                            <p:txEl>
+                                              <p:pRg st="7" end="7"/>
+                                            </p:txEl>
+                                          </p:spTgt>
+                                        </p:tgtEl>
+                                        <p:attrNameLst>
+                                          <p:attrName>style.visibility</p:attrName>
+                                        </p:attrNameLst>
+                                      </p:cBhvr>
+                                      <p:to>
+                                        <p:strVal val="visible"/>
+                                      </p:to>
+                                    </p:set>
+                                    <p:animEffect transition="in" filter="fade">
+                                      <p:cBhvr>
+                                        <p:cTn id="27" dur="500"/>
+                                        <p:tgtEl>
+                                          <p:spTgt spid="6">
+                                            <p:txEl>
+                                              <p:pRg st="7" end="7"/>
+                                            </p:txEl>
+                                          </p:spTgt>
+                                        </p:tgtEl>
+                                      </p:cBhvr>
+                                    </p:animEffect>
+                                  </p:childTnLst>
+                                </p:cTn>
+                              </p:par>
+                            </p:childTnLst>
+                          </p:cTn>
+                        </p:par>
+                      </p:childTnLst>
+                    </p:cTn>
+                  </p:par>
                 </p:childTnLst>
               </p:cTn>
               <p:prevCondLst>
@@ -8829,22 +8685,22 @@
               <a:buAutoNum type="arabicPeriod"/>
             </a:pPr>
             <a:r>
-              <a:rPr lang="nl-NL" sz="2000" dirty="0" smtClean="0"/>
+              <a:rPr lang="nl-NL" sz="2400" dirty="0" smtClean="0"/>
               <a:t>Schrijf een falende test (specificaties en </a:t>
             </a:r>
             <a:r>
-              <a:rPr lang="nl-NL" sz="2000" dirty="0" err="1" smtClean="0"/>
+              <a:rPr lang="nl-NL" sz="2400" dirty="0" err="1" smtClean="0"/>
               <a:t>requirements</a:t>
             </a:r>
             <a:r>
-              <a:rPr lang="nl-NL" sz="2000" dirty="0" smtClean="0"/>
+              <a:rPr lang="nl-NL" sz="2400" dirty="0" smtClean="0"/>
               <a:t>!)</a:t>
             </a:r>
             <a:br>
-              <a:rPr lang="nl-NL" sz="2000" dirty="0" smtClean="0"/>
+              <a:rPr lang="nl-NL" sz="2400" dirty="0" smtClean="0"/>
             </a:br>
             <a:r>
-              <a:rPr lang="nl-NL" sz="2000" dirty="0" smtClean="0"/>
+              <a:rPr lang="nl-NL" sz="2400" dirty="0" smtClean="0"/>
               <a:t>mantra: rood - groen</a:t>
             </a:r>
           </a:p>
@@ -8857,17 +8713,17 @@
               <a:buAutoNum type="arabicPeriod"/>
             </a:pPr>
             <a:r>
-              <a:rPr lang="nl-NL" sz="2000" dirty="0" smtClean="0"/>
+              <a:rPr lang="nl-NL" sz="2400" dirty="0" smtClean="0"/>
               <a:t>Draai alle testen </a:t>
             </a:r>
             <a:r>
-              <a:rPr lang="nl-NL" sz="2000" dirty="0" smtClean="0">
+              <a:rPr lang="nl-NL" sz="2400" dirty="0" smtClean="0">
                 <a:sym typeface="Wingdings" panose="05000000000000000000" pitchFamily="2" charset="2"/>
               </a:rPr>
               <a:t> </a:t>
             </a:r>
             <a:r>
-              <a:rPr lang="nl-NL" sz="2000" dirty="0" smtClean="0"/>
+              <a:rPr lang="nl-NL" sz="2400" dirty="0" smtClean="0"/>
               <a:t>alleen laatste faalt</a:t>
             </a:r>
           </a:p>
@@ -8880,25 +8736,25 @@
               <a:buAutoNum type="arabicPeriod"/>
             </a:pPr>
             <a:r>
-              <a:rPr lang="nl-NL" sz="2000" dirty="0" smtClean="0"/>
+              <a:rPr lang="nl-NL" sz="2400" dirty="0" smtClean="0"/>
               <a:t>Schrijf code om test te laten slagen </a:t>
             </a:r>
             <a:r>
-              <a:rPr lang="nl-NL" sz="2000" dirty="0" smtClean="0">
+              <a:rPr lang="nl-NL" sz="2400" dirty="0" smtClean="0">
                 <a:sym typeface="Wingdings" panose="05000000000000000000" pitchFamily="2" charset="2"/>
               </a:rPr>
               <a:t> </a:t>
             </a:r>
             <a:r>
-              <a:rPr lang="nl-NL" sz="2000" dirty="0" smtClean="0"/>
+              <a:rPr lang="nl-NL" sz="2400" dirty="0" smtClean="0"/>
               <a:t>zo simpel mogelijk (KISS</a:t>
             </a:r>
             <a:r>
-              <a:rPr lang="nl-NL" sz="2000" dirty="0"/>
+              <a:rPr lang="nl-NL" sz="2400" dirty="0"/>
               <a:t>, </a:t>
             </a:r>
             <a:r>
-              <a:rPr lang="nl-NL" sz="2000" dirty="0" smtClean="0"/>
+              <a:rPr lang="nl-NL" sz="2400" dirty="0" smtClean="0"/>
               <a:t>YAGNI)</a:t>
             </a:r>
           </a:p>
@@ -8911,16 +8767,16 @@
               <a:buAutoNum type="arabicPeriod"/>
             </a:pPr>
             <a:r>
-              <a:rPr lang="nl-NL" sz="2000" dirty="0" smtClean="0"/>
+              <a:rPr lang="nl-NL" sz="2400" dirty="0" smtClean="0"/>
               <a:t>Draai alle testen </a:t>
             </a:r>
             <a:r>
-              <a:rPr lang="nl-NL" sz="2000" dirty="0" smtClean="0">
+              <a:rPr lang="nl-NL" sz="2400" dirty="0" smtClean="0">
                 <a:sym typeface="Wingdings" panose="05000000000000000000" pitchFamily="2" charset="2"/>
               </a:rPr>
               <a:t> alles succesvol</a:t>
             </a:r>
-            <a:endParaRPr lang="nl-NL" sz="2000" dirty="0" smtClean="0"/>
+            <a:endParaRPr lang="nl-NL" sz="2400" dirty="0" smtClean="0"/>
           </a:p>
           <a:p>
             <a:pPr marL="457200" indent="-457200">
@@ -8931,21 +8787,21 @@
               <a:buAutoNum type="arabicPeriod"/>
             </a:pPr>
             <a:r>
-              <a:rPr lang="nl-NL" sz="2000" dirty="0" err="1" smtClean="0"/>
+              <a:rPr lang="nl-NL" sz="2400" dirty="0" err="1" smtClean="0"/>
               <a:t>Refactor</a:t>
             </a:r>
             <a:r>
-              <a:rPr lang="nl-NL" sz="2000" dirty="0" smtClean="0"/>
+              <a:rPr lang="nl-NL" sz="2400" dirty="0" smtClean="0"/>
               <a:t> de code </a:t>
             </a:r>
             <a:r>
-              <a:rPr lang="nl-NL" sz="2000" dirty="0" smtClean="0">
+              <a:rPr lang="nl-NL" sz="2400" dirty="0" smtClean="0">
                 <a:sym typeface="Wingdings" panose="05000000000000000000" pitchFamily="2" charset="2"/>
               </a:rPr>
               <a:t> </a:t>
             </a:r>
             <a:r>
-              <a:rPr lang="nl-NL" sz="2000" dirty="0" smtClean="0"/>
+              <a:rPr lang="nl-NL" sz="2400" dirty="0" smtClean="0"/>
               <a:t>clean code, SOLID</a:t>
             </a:r>
           </a:p>
@@ -8958,26 +8814,26 @@
               <a:buAutoNum type="arabicPeriod"/>
             </a:pPr>
             <a:r>
-              <a:rPr lang="nl-NL" sz="2000" dirty="0"/>
+              <a:rPr lang="nl-NL" sz="2400" dirty="0"/>
               <a:t>D</a:t>
             </a:r>
             <a:r>
-              <a:rPr lang="nl-NL" sz="2000" dirty="0" smtClean="0"/>
+              <a:rPr lang="nl-NL" sz="2400" dirty="0" smtClean="0"/>
               <a:t>raai alle unit testen </a:t>
             </a:r>
             <a:r>
-              <a:rPr lang="nl-NL" sz="2000" dirty="0">
+              <a:rPr lang="nl-NL" sz="2400" dirty="0">
                 <a:sym typeface="Wingdings" panose="05000000000000000000" pitchFamily="2" charset="2"/>
               </a:rPr>
               <a:t> alles </a:t>
             </a:r>
             <a:r>
-              <a:rPr lang="nl-NL" sz="2000" dirty="0" smtClean="0">
+              <a:rPr lang="nl-NL" sz="2400" dirty="0" smtClean="0">
                 <a:sym typeface="Wingdings" panose="05000000000000000000" pitchFamily="2" charset="2"/>
               </a:rPr>
               <a:t>(nog steeds) succesvol</a:t>
             </a:r>
-            <a:endParaRPr lang="nl-NL" sz="2000" dirty="0"/>
+            <a:endParaRPr lang="nl-NL" sz="2400" dirty="0"/>
           </a:p>
           <a:p>
             <a:pPr marL="457200" indent="-457200">
@@ -8988,7 +8844,7 @@
               <a:buAutoNum type="arabicPeriod"/>
             </a:pPr>
             <a:r>
-              <a:rPr lang="nl-NL" sz="2000" dirty="0" smtClean="0"/>
+              <a:rPr lang="nl-NL" sz="2400" dirty="0" smtClean="0"/>
               <a:t>Herhaal</a:t>
             </a:r>
           </a:p>
@@ -9463,8 +9319,13 @@
             </a:pPr>
             <a:r>
               <a:rPr lang="nl-NL" sz="2400" dirty="0" smtClean="0"/>
-              <a:t>Geen overbodige code (YAGNI)</a:t>
-            </a:r>
+              <a:t>Geen overbodige code </a:t>
+            </a:r>
+            <a:r>
+              <a:rPr lang="nl-NL" sz="2400" dirty="0" smtClean="0"/>
+              <a:t>(KISS &amp; YAGNI principes)</a:t>
+            </a:r>
+            <a:endParaRPr lang="nl-NL" sz="2400" dirty="0" smtClean="0"/>
           </a:p>
           <a:p>
             <a:pPr>
@@ -9725,7 +9586,7 @@
         </p:nvSpPr>
         <p:spPr>
           <a:xfrm>
-            <a:off x="755576" y="1268760"/>
+            <a:off x="827584" y="1299120"/>
             <a:ext cx="7858447" cy="4896544"/>
           </a:xfrm>
         </p:spPr>
@@ -9739,15 +9600,23 @@
               </a:lnSpc>
               <a:buNone/>
             </a:pPr>
+            <a:endParaRPr lang="nl-NL" sz="2800" dirty="0" smtClean="0"/>
+          </a:p>
+          <a:p>
+            <a:pPr marL="0" indent="0">
+              <a:lnSpc>
+                <a:spcPct val="100000"/>
+              </a:lnSpc>
+              <a:buNone/>
+            </a:pPr>
             <a:r>
               <a:rPr lang="nl-NL" sz="2800" dirty="0" smtClean="0"/>
-              <a:t>Nadelen t.o.v. </a:t>
+              <a:t>Nadelen </a:t>
             </a:r>
             <a:r>
               <a:rPr lang="nl-NL" sz="2800" dirty="0" smtClean="0"/>
-              <a:t>geen unit testen</a:t>
-            </a:r>
-            <a:endParaRPr lang="nl-NL" sz="2800" dirty="0" smtClean="0"/>
+              <a:t>t.o.v. geen unit testen</a:t>
+            </a:r>
           </a:p>
           <a:p>
             <a:pPr>
@@ -9761,14 +9630,6 @@
             </a:r>
           </a:p>
           <a:p>
-            <a:pPr>
-              <a:lnSpc>
-                <a:spcPct val="100000"/>
-              </a:lnSpc>
-            </a:pPr>
-            <a:endParaRPr lang="nl-NL" sz="2400" dirty="0"/>
-          </a:p>
-          <a:p>
             <a:pPr marL="0" indent="0">
               <a:lnSpc>
                 <a:spcPct val="100000"/>
@@ -9806,15 +9667,7 @@
             </a:pPr>
             <a:r>
               <a:rPr lang="nl-NL" sz="2400" dirty="0" smtClean="0"/>
-              <a:t>Compleet </a:t>
-            </a:r>
-            <a:r>
-              <a:rPr lang="nl-NL" sz="2400" dirty="0" smtClean="0"/>
-              <a:t>ander </a:t>
-            </a:r>
-            <a:r>
-              <a:rPr lang="nl-NL" sz="2400" dirty="0" smtClean="0"/>
-              <a:t>concept / werkwijze</a:t>
+              <a:t>Compleet ander concept / werkwijze</a:t>
             </a:r>
           </a:p>
           <a:p>
@@ -9827,14 +9680,6 @@
               <a:rPr lang="nl-NL" sz="2400" dirty="0" smtClean="0"/>
               <a:t>Meer (test) code; meer tijd</a:t>
             </a:r>
-          </a:p>
-          <a:p>
-            <a:pPr>
-              <a:lnSpc>
-                <a:spcPct val="100000"/>
-              </a:lnSpc>
-            </a:pPr>
-            <a:endParaRPr lang="nl-NL" sz="2400" dirty="0" smtClean="0"/>
           </a:p>
           <a:p>
             <a:pPr>
@@ -9969,25 +9814,7 @@
               <a:rPr lang="nl-NL" sz="2800" dirty="0" smtClean="0">
                 <a:latin typeface="Bebas Neue" panose="020B0000000000000000" pitchFamily="34" charset="0"/>
               </a:rPr>
-              <a:t>Test </a:t>
-            </a:r>
-            <a:r>
-              <a:rPr lang="nl-NL" sz="2800" dirty="0" err="1" smtClean="0">
-                <a:latin typeface="Bebas Neue" panose="020B0000000000000000" pitchFamily="34" charset="0"/>
-              </a:rPr>
-              <a:t>driven</a:t>
-            </a:r>
-            <a:r>
-              <a:rPr lang="nl-NL" sz="2800" dirty="0" smtClean="0">
-                <a:latin typeface="Bebas Neue" panose="020B0000000000000000" pitchFamily="34" charset="0"/>
-              </a:rPr>
-              <a:t> </a:t>
-            </a:r>
-            <a:r>
-              <a:rPr lang="nl-NL" sz="2800" dirty="0" err="1" smtClean="0">
-                <a:latin typeface="Bebas Neue" panose="020B0000000000000000" pitchFamily="34" charset="0"/>
-              </a:rPr>
-              <a:t>development</a:t>
+              <a:t>Pair Programming</a:t>
             </a:r>
             <a:endParaRPr lang="nl-NL" dirty="0">
               <a:latin typeface="Bebas Neue" panose="020B0000000000000000" pitchFamily="34" charset="0"/>
@@ -10016,49 +9843,13 @@
           <a:lstStyle/>
           <a:p>
             <a:r>
-              <a:rPr lang="nl-NL" sz="2000" dirty="0" err="1" smtClean="0">
+              <a:rPr lang="nl-NL" sz="2000" dirty="0" smtClean="0">
                 <a:solidFill>
                   <a:srgbClr val="A5CD39"/>
                 </a:solidFill>
                 <a:latin typeface="Bebas Neue" panose="020B0000000000000000" pitchFamily="34" charset="0"/>
               </a:rPr>
-              <a:t>With</a:t>
-            </a:r>
-            <a:r>
-              <a:rPr lang="nl-NL" sz="2000" dirty="0" smtClean="0">
-                <a:solidFill>
-                  <a:srgbClr val="A5CD39"/>
-                </a:solidFill>
-                <a:latin typeface="Bebas Neue" panose="020B0000000000000000" pitchFamily="34" charset="0"/>
-              </a:rPr>
-              <a:t> pair </a:t>
-            </a:r>
-            <a:r>
-              <a:rPr lang="nl-NL" sz="2000" dirty="0" err="1" smtClean="0">
-                <a:solidFill>
-                  <a:srgbClr val="A5CD39"/>
-                </a:solidFill>
-                <a:latin typeface="Bebas Neue" panose="020B0000000000000000" pitchFamily="34" charset="0"/>
-              </a:rPr>
-              <a:t>programming</a:t>
-            </a:r>
-            <a:r>
-              <a:rPr lang="nl-NL" sz="2000" dirty="0" smtClean="0">
-                <a:solidFill>
-                  <a:srgbClr val="A5CD39"/>
-                </a:solidFill>
-                <a:latin typeface="Bebas Neue" panose="020B0000000000000000" pitchFamily="34" charset="0"/>
-              </a:rPr>
-              <a:t> - </a:t>
-            </a:r>
-            <a:r>
-              <a:rPr lang="nl-NL" sz="2000" dirty="0" err="1" smtClean="0">
-                <a:solidFill>
-                  <a:srgbClr val="A5CD39"/>
-                </a:solidFill>
-                <a:latin typeface="Bebas Neue" panose="020B0000000000000000" pitchFamily="34" charset="0"/>
-              </a:rPr>
-              <a:t>Guidelines</a:t>
+              <a:t>Nut?</a:t>
             </a:r>
             <a:endParaRPr lang="nl-NL" sz="2000" dirty="0">
               <a:solidFill>
@@ -10081,8 +9872,8 @@
         </p:nvSpPr>
         <p:spPr>
           <a:xfrm>
-            <a:off x="755576" y="1268760"/>
-            <a:ext cx="7858447" cy="4896544"/>
+            <a:off x="755576" y="1556792"/>
+            <a:ext cx="7858447" cy="4608512"/>
           </a:xfrm>
         </p:spPr>
         <p:txBody>
@@ -10215,9 +10006,12 @@
             </a:pPr>
             <a:r>
               <a:rPr lang="nl-NL" sz="2400" dirty="0" smtClean="0"/>
-              <a:t>Flexibiliteit in team</a:t>
-            </a:r>
-            <a:endParaRPr lang="nl-NL" sz="2400" dirty="0"/>
+              <a:t>Flexibiliteit in </a:t>
+            </a:r>
+            <a:r>
+              <a:rPr lang="nl-NL" sz="2400" dirty="0" smtClean="0"/>
+              <a:t>team</a:t>
+            </a:r>
           </a:p>
           <a:p>
             <a:pPr marL="0" indent="0">
@@ -10307,6 +10101,36 @@
           </a:p>
         </p:txBody>
       </p:sp>
+      <p:pic>
+        <p:nvPicPr>
+          <p:cNvPr id="2" name="Picture 1"/>
+          <p:cNvPicPr>
+            <a:picLocks noChangeAspect="1"/>
+          </p:cNvPicPr>
+          <p:nvPr/>
+        </p:nvPicPr>
+        <p:blipFill>
+          <a:blip r:embed="rId2">
+            <a:extLst>
+              <a:ext uri="{28A0092B-C50C-407E-A947-70E740481C1C}">
+                <a14:useLocalDpi xmlns:a14="http://schemas.microsoft.com/office/drawing/2010/main" val="0"/>
+              </a:ext>
+            </a:extLst>
+          </a:blip>
+          <a:stretch>
+            <a:fillRect/>
+          </a:stretch>
+        </p:blipFill>
+        <p:spPr>
+          <a:xfrm>
+            <a:off x="5076056" y="1556792"/>
+            <a:ext cx="3263975" cy="2411130"/>
+          </a:xfrm>
+          <a:prstGeom prst="rect">
+            <a:avLst/>
+          </a:prstGeom>
+        </p:spPr>
+      </p:pic>
     </p:spTree>
     <p:extLst>
       <p:ext uri="{BB962C8B-B14F-4D97-AF65-F5344CB8AC3E}">
@@ -10368,25 +10192,13 @@
               <a:rPr lang="nl-NL" sz="2800" dirty="0" smtClean="0">
                 <a:latin typeface="Bebas Neue" panose="020B0000000000000000" pitchFamily="34" charset="0"/>
               </a:rPr>
-              <a:t>Test </a:t>
+              <a:t>Pair </a:t>
             </a:r>
             <a:r>
               <a:rPr lang="nl-NL" sz="2800" dirty="0" err="1" smtClean="0">
                 <a:latin typeface="Bebas Neue" panose="020B0000000000000000" pitchFamily="34" charset="0"/>
               </a:rPr>
-              <a:t>driven</a:t>
-            </a:r>
-            <a:r>
-              <a:rPr lang="nl-NL" sz="2800" dirty="0" smtClean="0">
-                <a:latin typeface="Bebas Neue" panose="020B0000000000000000" pitchFamily="34" charset="0"/>
-              </a:rPr>
-              <a:t> </a:t>
-            </a:r>
-            <a:r>
-              <a:rPr lang="nl-NL" sz="2800" dirty="0" err="1" smtClean="0">
-                <a:latin typeface="Bebas Neue" panose="020B0000000000000000" pitchFamily="34" charset="0"/>
-              </a:rPr>
-              <a:t>development</a:t>
+              <a:t>programming</a:t>
             </a:r>
             <a:endParaRPr lang="nl-NL" dirty="0">
               <a:latin typeface="Bebas Neue" panose="020B0000000000000000" pitchFamily="34" charset="0"/>
@@ -10415,40 +10227,13 @@
           <a:lstStyle/>
           <a:p>
             <a:r>
-              <a:rPr lang="nl-NL" sz="2000" dirty="0" err="1" smtClean="0">
+              <a:rPr lang="nl-NL" sz="2000" dirty="0" smtClean="0">
                 <a:solidFill>
                   <a:srgbClr val="A5CD39"/>
                 </a:solidFill>
                 <a:latin typeface="Bebas Neue" panose="020B0000000000000000" pitchFamily="34" charset="0"/>
               </a:rPr>
-              <a:t>With</a:t>
-            </a:r>
-            <a:r>
-              <a:rPr lang="nl-NL" sz="2000" dirty="0" smtClean="0">
-                <a:solidFill>
-                  <a:srgbClr val="A5CD39"/>
-                </a:solidFill>
-                <a:latin typeface="Bebas Neue" panose="020B0000000000000000" pitchFamily="34" charset="0"/>
-              </a:rPr>
-              <a:t> pair </a:t>
-            </a:r>
-            <a:r>
-              <a:rPr lang="nl-NL" sz="2000" dirty="0" err="1" smtClean="0">
-                <a:solidFill>
-                  <a:srgbClr val="A5CD39"/>
-                </a:solidFill>
-                <a:latin typeface="Bebas Neue" panose="020B0000000000000000" pitchFamily="34" charset="0"/>
-              </a:rPr>
-              <a:t>programming</a:t>
-            </a:r>
-            <a:r>
-              <a:rPr lang="nl-NL" sz="2000" dirty="0" smtClean="0">
-                <a:solidFill>
-                  <a:srgbClr val="A5CD39"/>
-                </a:solidFill>
-                <a:latin typeface="Bebas Neue" panose="020B0000000000000000" pitchFamily="34" charset="0"/>
-              </a:rPr>
-              <a:t> - concept</a:t>
+              <a:t>concept</a:t>
             </a:r>
             <a:endParaRPr lang="nl-NL" sz="2000" dirty="0">
               <a:solidFill>
@@ -10456,240 +10241,6 @@
               </a:solidFill>
               <a:latin typeface="Bebas Neue" panose="020B0000000000000000" pitchFamily="34" charset="0"/>
             </a:endParaRPr>
-          </a:p>
-        </p:txBody>
-      </p:sp>
-      <p:sp>
-        <p:nvSpPr>
-          <p:cNvPr id="6" name="Text Placeholder 2"/>
-          <p:cNvSpPr>
-            <a:spLocks noGrp="1"/>
-          </p:cNvSpPr>
-          <p:nvPr>
-            <p:ph type="body" sz="quarter" idx="12"/>
-          </p:nvPr>
-        </p:nvSpPr>
-        <p:spPr>
-          <a:xfrm>
-            <a:off x="755576" y="1196752"/>
-            <a:ext cx="7858447" cy="4896544"/>
-          </a:xfrm>
-        </p:spPr>
-        <p:txBody>
-          <a:bodyPr/>
-          <a:lstStyle/>
-          <a:p>
-            <a:pPr marL="0" indent="0">
-              <a:lnSpc>
-                <a:spcPct val="100000"/>
-              </a:lnSpc>
-              <a:buNone/>
-            </a:pPr>
-            <a:r>
-              <a:rPr lang="nl-NL" sz="2400" dirty="0" smtClean="0"/>
-              <a:t>De Navigator</a:t>
-            </a:r>
-          </a:p>
-          <a:p>
-            <a:pPr marL="0" indent="0">
-              <a:lnSpc>
-                <a:spcPct val="100000"/>
-              </a:lnSpc>
-              <a:buNone/>
-            </a:pPr>
-            <a:r>
-              <a:rPr lang="nl-NL" sz="2400" dirty="0" smtClean="0"/>
-              <a:t>(/</a:t>
-            </a:r>
-            <a:r>
-              <a:rPr lang="nl-NL" sz="2400" dirty="0" err="1" smtClean="0"/>
-              <a:t>observer</a:t>
-            </a:r>
-            <a:endParaRPr lang="nl-NL" sz="2400" dirty="0" smtClean="0"/>
-          </a:p>
-          <a:p>
-            <a:pPr marL="0" indent="0">
-              <a:lnSpc>
-                <a:spcPct val="100000"/>
-              </a:lnSpc>
-              <a:buNone/>
-            </a:pPr>
-            <a:r>
-              <a:rPr lang="nl-NL" sz="2400" dirty="0" smtClean="0"/>
-              <a:t>/co-driver)</a:t>
-            </a:r>
-            <a:endParaRPr lang="nl-NL" sz="2400" dirty="0"/>
-          </a:p>
-          <a:p>
-            <a:pPr marL="0" indent="0">
-              <a:lnSpc>
-                <a:spcPct val="100000"/>
-              </a:lnSpc>
-              <a:buNone/>
-            </a:pPr>
-            <a:endParaRPr lang="nl-NL" sz="2400" dirty="0" smtClean="0"/>
-          </a:p>
-          <a:p>
-            <a:pPr marL="0" indent="0">
-              <a:lnSpc>
-                <a:spcPct val="100000"/>
-              </a:lnSpc>
-              <a:buNone/>
-            </a:pPr>
-            <a:endParaRPr lang="nl-NL" sz="2400" dirty="0" smtClean="0"/>
-          </a:p>
-          <a:p>
-            <a:pPr marL="0" indent="0">
-              <a:lnSpc>
-                <a:spcPct val="100000"/>
-              </a:lnSpc>
-              <a:buNone/>
-            </a:pPr>
-            <a:endParaRPr lang="nl-NL" sz="2400" dirty="0"/>
-          </a:p>
-          <a:p>
-            <a:pPr marL="0" indent="0">
-              <a:lnSpc>
-                <a:spcPct val="100000"/>
-              </a:lnSpc>
-              <a:buNone/>
-            </a:pPr>
-            <a:endParaRPr lang="nl-NL" sz="2400" dirty="0" smtClean="0"/>
-          </a:p>
-          <a:p>
-            <a:pPr marL="0" indent="0">
-              <a:lnSpc>
-                <a:spcPct val="100000"/>
-              </a:lnSpc>
-              <a:buNone/>
-            </a:pPr>
-            <a:r>
-              <a:rPr lang="nl-NL" sz="2400" dirty="0" smtClean="0"/>
-              <a:t>GEEN code schrijven (“Laat mij maar even…”)</a:t>
-            </a:r>
-          </a:p>
-          <a:p>
-            <a:pPr marL="0" indent="0">
-              <a:lnSpc>
-                <a:spcPct val="100000"/>
-              </a:lnSpc>
-              <a:buNone/>
-            </a:pPr>
-            <a:r>
-              <a:rPr lang="nl-NL" sz="2400" dirty="0" smtClean="0"/>
-              <a:t>Houdt focus: KISS, YAGNI</a:t>
-            </a:r>
-          </a:p>
-          <a:p>
-            <a:pPr marL="0" indent="0">
-              <a:lnSpc>
-                <a:spcPct val="100000"/>
-              </a:lnSpc>
-              <a:buNone/>
-            </a:pPr>
-            <a:r>
-              <a:rPr lang="nl-NL" sz="2400" dirty="0" err="1" smtClean="0"/>
-              <a:t>Checked</a:t>
-            </a:r>
-            <a:r>
-              <a:rPr lang="nl-NL" sz="2400" dirty="0" smtClean="0"/>
-              <a:t> leesbaarheid / </a:t>
-            </a:r>
-            <a:r>
-              <a:rPr lang="nl-NL" sz="2400" dirty="0" err="1" smtClean="0"/>
-              <a:t>style</a:t>
-            </a:r>
-            <a:r>
-              <a:rPr lang="nl-NL" sz="2400" dirty="0" smtClean="0"/>
-              <a:t> code (begrijp ik het ook?)</a:t>
-            </a:r>
-          </a:p>
-          <a:p>
-            <a:pPr marL="0" indent="0">
-              <a:lnSpc>
-                <a:spcPct val="100000"/>
-              </a:lnSpc>
-              <a:buNone/>
-            </a:pPr>
-            <a:r>
-              <a:rPr lang="nl-NL" sz="2400" dirty="0" smtClean="0"/>
-              <a:t>Helpt / denkt mee (big picture)</a:t>
-            </a:r>
-          </a:p>
-          <a:p>
-            <a:pPr marL="0" indent="0">
-              <a:lnSpc>
-                <a:spcPct val="100000"/>
-              </a:lnSpc>
-              <a:buNone/>
-            </a:pPr>
-            <a:r>
-              <a:rPr lang="nl-NL" sz="2400" dirty="0" smtClean="0"/>
-              <a:t>Niet direct commentaar / hulp geven</a:t>
-            </a:r>
-          </a:p>
-          <a:p>
-            <a:pPr marL="0" indent="0">
-              <a:lnSpc>
-                <a:spcPct val="100000"/>
-              </a:lnSpc>
-              <a:buNone/>
-            </a:pPr>
-            <a:r>
-              <a:rPr lang="nl-NL" sz="2400" dirty="0" smtClean="0"/>
-              <a:t>Stel vragen</a:t>
-            </a:r>
-            <a:endParaRPr lang="nl-NL" sz="2400" dirty="0" smtClean="0"/>
-          </a:p>
-          <a:p>
-            <a:pPr marL="0" indent="0">
-              <a:lnSpc>
-                <a:spcPct val="100000"/>
-              </a:lnSpc>
-              <a:buNone/>
-            </a:pPr>
-            <a:endParaRPr lang="nl-NL" sz="2400" dirty="0" smtClean="0"/>
-          </a:p>
-          <a:p>
-            <a:pPr marL="0" indent="0">
-              <a:lnSpc>
-                <a:spcPct val="100000"/>
-              </a:lnSpc>
-              <a:buNone/>
-            </a:pPr>
-            <a:endParaRPr lang="nl-NL" sz="2400" dirty="0" smtClean="0"/>
-          </a:p>
-          <a:p>
-            <a:pPr>
-              <a:lnSpc>
-                <a:spcPct val="100000"/>
-              </a:lnSpc>
-            </a:pPr>
-            <a:endParaRPr lang="nl-NL" sz="2400" dirty="0" smtClean="0"/>
-          </a:p>
-          <a:p>
-            <a:pPr>
-              <a:lnSpc>
-                <a:spcPct val="100000"/>
-              </a:lnSpc>
-            </a:pPr>
-            <a:endParaRPr lang="nl-NL" sz="2000" dirty="0"/>
-          </a:p>
-          <a:p>
-            <a:pPr>
-              <a:lnSpc>
-                <a:spcPct val="100000"/>
-              </a:lnSpc>
-            </a:pPr>
-            <a:endParaRPr lang="nl-NL" sz="2000" dirty="0"/>
-          </a:p>
-          <a:p>
-            <a:pPr>
-              <a:lnSpc>
-                <a:spcPct val="100000"/>
-              </a:lnSpc>
-            </a:pPr>
-            <a:endParaRPr lang="nl-NL" sz="1600" dirty="0" smtClean="0"/>
           </a:p>
         </p:txBody>
       </p:sp>
@@ -10715,14 +10266,201 @@
         </p:blipFill>
         <p:spPr>
           <a:xfrm>
-            <a:off x="2843808" y="1343185"/>
-            <a:ext cx="4176464" cy="2961681"/>
+            <a:off x="755576" y="1299121"/>
+            <a:ext cx="7632848" cy="5484394"/>
           </a:xfrm>
           <a:prstGeom prst="rect">
             <a:avLst/>
           </a:prstGeom>
         </p:spPr>
       </p:pic>
+      <p:sp>
+        <p:nvSpPr>
+          <p:cNvPr id="6" name="Text Placeholder 2"/>
+          <p:cNvSpPr>
+            <a:spLocks noGrp="1"/>
+          </p:cNvSpPr>
+          <p:nvPr>
+            <p:ph type="body" sz="quarter" idx="12"/>
+          </p:nvPr>
+        </p:nvSpPr>
+        <p:spPr>
+          <a:xfrm>
+            <a:off x="755576" y="1299120"/>
+            <a:ext cx="7920879" cy="5370240"/>
+          </a:xfrm>
+        </p:spPr>
+        <p:txBody>
+          <a:bodyPr/>
+          <a:lstStyle/>
+          <a:p>
+            <a:pPr marL="0" indent="0">
+              <a:lnSpc>
+                <a:spcPct val="100000"/>
+              </a:lnSpc>
+              <a:buNone/>
+            </a:pPr>
+            <a:r>
+              <a:rPr lang="nl-NL" sz="3200" dirty="0" smtClean="0"/>
+              <a:t>De Navigator / </a:t>
+            </a:r>
+            <a:r>
+              <a:rPr lang="nl-NL" sz="3200" dirty="0" err="1" smtClean="0"/>
+              <a:t>observer</a:t>
+            </a:r>
+            <a:r>
+              <a:rPr lang="nl-NL" sz="3200" dirty="0" smtClean="0"/>
+              <a:t> /co-driver)</a:t>
+            </a:r>
+            <a:endParaRPr lang="nl-NL" sz="3200" dirty="0"/>
+          </a:p>
+          <a:p>
+            <a:pPr marL="0" indent="0">
+              <a:lnSpc>
+                <a:spcPct val="100000"/>
+              </a:lnSpc>
+              <a:buNone/>
+            </a:pPr>
+            <a:endParaRPr lang="nl-NL" sz="2400" dirty="0" smtClean="0"/>
+          </a:p>
+          <a:p>
+            <a:pPr>
+              <a:lnSpc>
+                <a:spcPct val="150000"/>
+              </a:lnSpc>
+            </a:pPr>
+            <a:r>
+              <a:rPr lang="nl-NL" sz="2400" dirty="0" smtClean="0"/>
+              <a:t>Houdt de oplossing / het probleem in de gaten</a:t>
+            </a:r>
+            <a:endParaRPr lang="nl-NL" sz="2400" dirty="0"/>
+          </a:p>
+          <a:p>
+            <a:pPr>
+              <a:lnSpc>
+                <a:spcPct val="150000"/>
+              </a:lnSpc>
+            </a:pPr>
+            <a:r>
+              <a:rPr lang="nl-NL" sz="2400" dirty="0" smtClean="0"/>
+              <a:t>Stel vragen</a:t>
+            </a:r>
+          </a:p>
+          <a:p>
+            <a:pPr>
+              <a:lnSpc>
+                <a:spcPct val="150000"/>
+              </a:lnSpc>
+            </a:pPr>
+            <a:r>
+              <a:rPr lang="nl-NL" sz="2400" dirty="0" smtClean="0"/>
+              <a:t>GEEN code schrijven (“Laat mij maar even…”)</a:t>
+            </a:r>
+          </a:p>
+          <a:p>
+            <a:pPr>
+              <a:lnSpc>
+                <a:spcPct val="150000"/>
+              </a:lnSpc>
+            </a:pPr>
+            <a:r>
+              <a:rPr lang="nl-NL" sz="2400" dirty="0" smtClean="0"/>
+              <a:t>Houdt focus: KISS, YAGNI</a:t>
+            </a:r>
+          </a:p>
+          <a:p>
+            <a:pPr>
+              <a:lnSpc>
+                <a:spcPct val="150000"/>
+              </a:lnSpc>
+            </a:pPr>
+            <a:r>
+              <a:rPr lang="nl-NL" sz="2400" dirty="0" smtClean="0"/>
+              <a:t>Controleert op leesbaarheid en begrijpelijke code</a:t>
+            </a:r>
+          </a:p>
+          <a:p>
+            <a:pPr>
+              <a:lnSpc>
+                <a:spcPct val="150000"/>
+              </a:lnSpc>
+            </a:pPr>
+            <a:r>
+              <a:rPr lang="nl-NL" sz="2400" dirty="0" smtClean="0"/>
+              <a:t>Helpt / denkt mee (big picture)</a:t>
+            </a:r>
+          </a:p>
+          <a:p>
+            <a:pPr>
+              <a:lnSpc>
+                <a:spcPct val="150000"/>
+              </a:lnSpc>
+            </a:pPr>
+            <a:r>
+              <a:rPr lang="nl-NL" sz="2400" dirty="0" smtClean="0"/>
+              <a:t>Niet direct commentaar / hulp geven</a:t>
+            </a:r>
+          </a:p>
+          <a:p>
+            <a:pPr>
+              <a:lnSpc>
+                <a:spcPct val="100000"/>
+              </a:lnSpc>
+            </a:pPr>
+            <a:endParaRPr lang="nl-NL" sz="2400" dirty="0" smtClean="0"/>
+          </a:p>
+          <a:p>
+            <a:pPr marL="0" indent="0">
+              <a:lnSpc>
+                <a:spcPct val="100000"/>
+              </a:lnSpc>
+              <a:buNone/>
+            </a:pPr>
+            <a:endParaRPr lang="nl-NL" sz="2400" dirty="0" smtClean="0"/>
+          </a:p>
+          <a:p>
+            <a:pPr marL="0" indent="0">
+              <a:lnSpc>
+                <a:spcPct val="100000"/>
+              </a:lnSpc>
+              <a:buNone/>
+            </a:pPr>
+            <a:endParaRPr lang="nl-NL" sz="2400" dirty="0" smtClean="0"/>
+          </a:p>
+          <a:p>
+            <a:pPr>
+              <a:lnSpc>
+                <a:spcPct val="100000"/>
+              </a:lnSpc>
+            </a:pPr>
+            <a:endParaRPr lang="nl-NL" sz="2400" dirty="0" smtClean="0"/>
+          </a:p>
+          <a:p>
+            <a:pPr>
+              <a:lnSpc>
+                <a:spcPct val="100000"/>
+              </a:lnSpc>
+            </a:pPr>
+            <a:endParaRPr lang="nl-NL" sz="2000" dirty="0"/>
+          </a:p>
+          <a:p>
+            <a:pPr>
+              <a:lnSpc>
+                <a:spcPct val="100000"/>
+              </a:lnSpc>
+            </a:pPr>
+            <a:endParaRPr lang="nl-NL" sz="2000" dirty="0"/>
+          </a:p>
+          <a:p>
+            <a:pPr>
+              <a:lnSpc>
+                <a:spcPct val="100000"/>
+              </a:lnSpc>
+            </a:pPr>
+            <a:endParaRPr lang="nl-NL" sz="1600" dirty="0" smtClean="0"/>
+          </a:p>
+        </p:txBody>
+      </p:sp>
     </p:spTree>
     <p:extLst>
       <p:ext uri="{BB962C8B-B14F-4D97-AF65-F5344CB8AC3E}">
@@ -10736,7 +10474,79 @@
   <p:timing>
     <p:tnLst>
       <p:par>
-        <p:cTn id="1" dur="indefinite" restart="never" nodeType="tmRoot"/>
+        <p:cTn id="1" dur="indefinite" restart="never" nodeType="tmRoot">
+          <p:childTnLst>
+            <p:seq concurrent="1" nextAc="seek">
+              <p:cTn id="2" dur="indefinite" nodeType="mainSeq">
+                <p:childTnLst>
+                  <p:par>
+                    <p:cTn id="3" fill="hold">
+                      <p:stCondLst>
+                        <p:cond delay="indefinite"/>
+                      </p:stCondLst>
+                      <p:childTnLst>
+                        <p:par>
+                          <p:cTn id="4" fill="hold">
+                            <p:stCondLst>
+                              <p:cond delay="0"/>
+                            </p:stCondLst>
+                            <p:childTnLst>
+                              <p:par>
+                                <p:cTn id="5" presetID="9" presetClass="emph" presetSubtype="0" nodeType="clickEffect">
+                                  <p:stCondLst>
+                                    <p:cond delay="0"/>
+                                  </p:stCondLst>
+                                  <p:childTnLst>
+                                    <p:set>
+                                      <p:cBhvr rctx="PPT">
+                                        <p:cTn id="6" dur="indefinite"/>
+                                        <p:tgtEl>
+                                          <p:spTgt spid="2"/>
+                                        </p:tgtEl>
+                                        <p:attrNameLst>
+                                          <p:attrName>style.opacity</p:attrName>
+                                        </p:attrNameLst>
+                                      </p:cBhvr>
+                                      <p:to>
+                                        <p:strVal val="0.5"/>
+                                      </p:to>
+                                    </p:set>
+                                    <p:animEffect filter="image" prLst="opacity: 0.5">
+                                      <p:cBhvr rctx="IE">
+                                        <p:cTn id="7" dur="indefinite"/>
+                                        <p:tgtEl>
+                                          <p:spTgt spid="2"/>
+                                        </p:tgtEl>
+                                      </p:cBhvr>
+                                    </p:animEffect>
+                                  </p:childTnLst>
+                                </p:cTn>
+                              </p:par>
+                            </p:childTnLst>
+                          </p:cTn>
+                        </p:par>
+                      </p:childTnLst>
+                    </p:cTn>
+                  </p:par>
+                </p:childTnLst>
+              </p:cTn>
+              <p:prevCondLst>
+                <p:cond evt="onPrev" delay="0">
+                  <p:tgtEl>
+                    <p:sldTgt/>
+                  </p:tgtEl>
+                </p:cond>
+              </p:prevCondLst>
+              <p:nextCondLst>
+                <p:cond evt="onNext" delay="0">
+                  <p:tgtEl>
+                    <p:sldTgt/>
+                  </p:tgtEl>
+                </p:cond>
+              </p:nextCondLst>
+            </p:seq>
+          </p:childTnLst>
+        </p:cTn>
       </p:par>
     </p:tnLst>
   </p:timing>
@@ -10781,30 +10591,18 @@
           <a:lstStyle/>
           <a:p>
             <a:r>
-              <a:rPr lang="nl-NL" sz="2800" dirty="0" smtClean="0">
+              <a:rPr lang="nl-NL" sz="2800" dirty="0">
                 <a:latin typeface="Bebas Neue" panose="020B0000000000000000" pitchFamily="34" charset="0"/>
               </a:rPr>
-              <a:t>Test </a:t>
-            </a:r>
-            <a:r>
-              <a:rPr lang="nl-NL" sz="2800" dirty="0" err="1" smtClean="0">
+              <a:t>Pair </a:t>
+            </a:r>
+            <a:r>
+              <a:rPr lang="nl-NL" sz="2800" dirty="0" err="1">
                 <a:latin typeface="Bebas Neue" panose="020B0000000000000000" pitchFamily="34" charset="0"/>
               </a:rPr>
-              <a:t>driven</a:t>
-            </a:r>
-            <a:r>
-              <a:rPr lang="nl-NL" sz="2800" dirty="0" smtClean="0">
-                <a:latin typeface="Bebas Neue" panose="020B0000000000000000" pitchFamily="34" charset="0"/>
-              </a:rPr>
-              <a:t> </a:t>
-            </a:r>
-            <a:r>
-              <a:rPr lang="nl-NL" sz="2800" dirty="0" err="1" smtClean="0">
-                <a:latin typeface="Bebas Neue" panose="020B0000000000000000" pitchFamily="34" charset="0"/>
-              </a:rPr>
-              <a:t>development</a:t>
-            </a:r>
-            <a:endParaRPr lang="nl-NL" dirty="0">
+              <a:t>programming</a:t>
+            </a:r>
+            <a:endParaRPr lang="nl-NL" sz="2800" dirty="0">
               <a:latin typeface="Bebas Neue" panose="020B0000000000000000" pitchFamily="34" charset="0"/>
             </a:endParaRPr>
           </a:p>
@@ -10831,40 +10629,13 @@
           <a:lstStyle/>
           <a:p>
             <a:r>
-              <a:rPr lang="nl-NL" sz="2000" dirty="0" err="1" smtClean="0">
+              <a:rPr lang="nl-NL" sz="2000" dirty="0" smtClean="0">
                 <a:solidFill>
                   <a:srgbClr val="A5CD39"/>
                 </a:solidFill>
                 <a:latin typeface="Bebas Neue" panose="020B0000000000000000" pitchFamily="34" charset="0"/>
               </a:rPr>
-              <a:t>With</a:t>
-            </a:r>
-            <a:r>
-              <a:rPr lang="nl-NL" sz="2000" dirty="0" smtClean="0">
-                <a:solidFill>
-                  <a:srgbClr val="A5CD39"/>
-                </a:solidFill>
-                <a:latin typeface="Bebas Neue" panose="020B0000000000000000" pitchFamily="34" charset="0"/>
-              </a:rPr>
-              <a:t> pair </a:t>
-            </a:r>
-            <a:r>
-              <a:rPr lang="nl-NL" sz="2000" dirty="0" err="1" smtClean="0">
-                <a:solidFill>
-                  <a:srgbClr val="A5CD39"/>
-                </a:solidFill>
-                <a:latin typeface="Bebas Neue" panose="020B0000000000000000" pitchFamily="34" charset="0"/>
-              </a:rPr>
-              <a:t>programming</a:t>
-            </a:r>
-            <a:r>
-              <a:rPr lang="nl-NL" sz="2000" dirty="0" smtClean="0">
-                <a:solidFill>
-                  <a:srgbClr val="A5CD39"/>
-                </a:solidFill>
-                <a:latin typeface="Bebas Neue" panose="020B0000000000000000" pitchFamily="34" charset="0"/>
-              </a:rPr>
-              <a:t> - concept</a:t>
+              <a:t>concept</a:t>
             </a:r>
             <a:endParaRPr lang="nl-NL" sz="2000" dirty="0">
               <a:solidFill>
@@ -10872,201 +10643,6 @@
               </a:solidFill>
               <a:latin typeface="Bebas Neue" panose="020B0000000000000000" pitchFamily="34" charset="0"/>
             </a:endParaRPr>
-          </a:p>
-        </p:txBody>
-      </p:sp>
-      <p:sp>
-        <p:nvSpPr>
-          <p:cNvPr id="6" name="Text Placeholder 2"/>
-          <p:cNvSpPr>
-            <a:spLocks noGrp="1"/>
-          </p:cNvSpPr>
-          <p:nvPr>
-            <p:ph type="body" sz="quarter" idx="12"/>
-          </p:nvPr>
-        </p:nvSpPr>
-        <p:spPr>
-          <a:xfrm>
-            <a:off x="755576" y="1268760"/>
-            <a:ext cx="7858447" cy="4896544"/>
-          </a:xfrm>
-        </p:spPr>
-        <p:txBody>
-          <a:bodyPr/>
-          <a:lstStyle/>
-          <a:p>
-            <a:pPr marL="0" indent="0">
-              <a:lnSpc>
-                <a:spcPct val="100000"/>
-              </a:lnSpc>
-              <a:buNone/>
-            </a:pPr>
-            <a:r>
-              <a:rPr lang="nl-NL" sz="2400" dirty="0" smtClean="0"/>
-              <a:t>De Driver</a:t>
-            </a:r>
-          </a:p>
-          <a:p>
-            <a:pPr marL="0" indent="0">
-              <a:lnSpc>
-                <a:spcPct val="100000"/>
-              </a:lnSpc>
-              <a:buNone/>
-            </a:pPr>
-            <a:endParaRPr lang="nl-NL" sz="2400" dirty="0" smtClean="0"/>
-          </a:p>
-          <a:p>
-            <a:pPr marL="0" indent="0">
-              <a:lnSpc>
-                <a:spcPct val="100000"/>
-              </a:lnSpc>
-              <a:buNone/>
-            </a:pPr>
-            <a:endParaRPr lang="nl-NL" sz="2400" dirty="0"/>
-          </a:p>
-          <a:p>
-            <a:pPr marL="0" indent="0">
-              <a:lnSpc>
-                <a:spcPct val="100000"/>
-              </a:lnSpc>
-              <a:buNone/>
-            </a:pPr>
-            <a:endParaRPr lang="nl-NL" sz="2400" dirty="0" smtClean="0"/>
-          </a:p>
-          <a:p>
-            <a:pPr marL="0" indent="0">
-              <a:lnSpc>
-                <a:spcPct val="100000"/>
-              </a:lnSpc>
-              <a:buNone/>
-            </a:pPr>
-            <a:endParaRPr lang="nl-NL" sz="2400" dirty="0"/>
-          </a:p>
-          <a:p>
-            <a:pPr marL="0" indent="0">
-              <a:lnSpc>
-                <a:spcPct val="100000"/>
-              </a:lnSpc>
-              <a:buNone/>
-            </a:pPr>
-            <a:endParaRPr lang="nl-NL" sz="2400" dirty="0" smtClean="0"/>
-          </a:p>
-          <a:p>
-            <a:pPr marL="0" indent="0">
-              <a:lnSpc>
-                <a:spcPct val="100000"/>
-              </a:lnSpc>
-              <a:buNone/>
-            </a:pPr>
-            <a:endParaRPr lang="nl-NL" sz="2400" dirty="0"/>
-          </a:p>
-          <a:p>
-            <a:pPr marL="0" indent="0">
-              <a:lnSpc>
-                <a:spcPct val="100000"/>
-              </a:lnSpc>
-              <a:buNone/>
-            </a:pPr>
-            <a:endParaRPr lang="nl-NL" sz="2400" dirty="0" smtClean="0"/>
-          </a:p>
-          <a:p>
-            <a:pPr marL="0" indent="0">
-              <a:lnSpc>
-                <a:spcPct val="100000"/>
-              </a:lnSpc>
-              <a:buNone/>
-            </a:pPr>
-            <a:r>
-              <a:rPr lang="nl-NL" sz="2400" dirty="0" smtClean="0"/>
-              <a:t>Schrijft de code</a:t>
-            </a:r>
-          </a:p>
-          <a:p>
-            <a:pPr marL="0" indent="0">
-              <a:lnSpc>
-                <a:spcPct val="100000"/>
-              </a:lnSpc>
-              <a:buNone/>
-            </a:pPr>
-            <a:r>
-              <a:rPr lang="nl-NL" sz="2400" dirty="0" smtClean="0"/>
-              <a:t>Luistert naar de navigator</a:t>
-            </a:r>
-          </a:p>
-          <a:p>
-            <a:pPr marL="0" indent="0">
-              <a:lnSpc>
-                <a:spcPct val="100000"/>
-              </a:lnSpc>
-              <a:buNone/>
-            </a:pPr>
-            <a:r>
-              <a:rPr lang="nl-NL" sz="2400" dirty="0" smtClean="0"/>
-              <a:t>Verteld de navigator zijn ideeën (vertel wat je denkt)</a:t>
-            </a:r>
-          </a:p>
-          <a:p>
-            <a:pPr marL="0" indent="0">
-              <a:lnSpc>
-                <a:spcPct val="100000"/>
-              </a:lnSpc>
-              <a:buNone/>
-            </a:pPr>
-            <a:r>
-              <a:rPr lang="nl-NL" sz="2400" dirty="0" smtClean="0"/>
-              <a:t>Reageer constructief op feedback van navigator</a:t>
-            </a:r>
-            <a:endParaRPr lang="nl-NL" sz="2400" dirty="0" smtClean="0"/>
-          </a:p>
-          <a:p>
-            <a:pPr marL="0" indent="0">
-              <a:lnSpc>
-                <a:spcPct val="100000"/>
-              </a:lnSpc>
-              <a:buNone/>
-            </a:pPr>
-            <a:endParaRPr lang="nl-NL" sz="2400" dirty="0" smtClean="0"/>
-          </a:p>
-          <a:p>
-            <a:pPr marL="0" indent="0">
-              <a:lnSpc>
-                <a:spcPct val="100000"/>
-              </a:lnSpc>
-              <a:buNone/>
-            </a:pPr>
-            <a:endParaRPr lang="nl-NL" sz="2400" dirty="0" smtClean="0"/>
-          </a:p>
-          <a:p>
-            <a:pPr>
-              <a:lnSpc>
-                <a:spcPct val="100000"/>
-              </a:lnSpc>
-            </a:pPr>
-            <a:endParaRPr lang="nl-NL" sz="2400" dirty="0" smtClean="0"/>
-          </a:p>
-          <a:p>
-            <a:pPr>
-              <a:lnSpc>
-                <a:spcPct val="100000"/>
-              </a:lnSpc>
-            </a:pPr>
-            <a:endParaRPr lang="nl-NL" sz="2000" dirty="0"/>
-          </a:p>
-          <a:p>
-            <a:pPr>
-              <a:lnSpc>
-                <a:spcPct val="100000"/>
-              </a:lnSpc>
-            </a:pPr>
-            <a:endParaRPr lang="nl-NL" sz="2000" dirty="0"/>
-          </a:p>
-          <a:p>
-            <a:pPr>
-              <a:lnSpc>
-                <a:spcPct val="100000"/>
-              </a:lnSpc>
-            </a:pPr>
-            <a:endParaRPr lang="nl-NL" sz="1600" dirty="0" smtClean="0"/>
           </a:p>
         </p:txBody>
       </p:sp>
@@ -11092,14 +10668,162 @@
         </p:blipFill>
         <p:spPr>
           <a:xfrm>
-            <a:off x="2123728" y="1327166"/>
-            <a:ext cx="6174352" cy="3469986"/>
+            <a:off x="539552" y="1308248"/>
+            <a:ext cx="8514320" cy="4785048"/>
           </a:xfrm>
           <a:prstGeom prst="rect">
             <a:avLst/>
           </a:prstGeom>
         </p:spPr>
       </p:pic>
+      <p:sp>
+        <p:nvSpPr>
+          <p:cNvPr id="6" name="Text Placeholder 2"/>
+          <p:cNvSpPr>
+            <a:spLocks noGrp="1"/>
+          </p:cNvSpPr>
+          <p:nvPr>
+            <p:ph type="body" sz="quarter" idx="12"/>
+          </p:nvPr>
+        </p:nvSpPr>
+        <p:spPr>
+          <a:xfrm>
+            <a:off x="755576" y="1268760"/>
+            <a:ext cx="7858447" cy="4896544"/>
+          </a:xfrm>
+        </p:spPr>
+        <p:txBody>
+          <a:bodyPr/>
+          <a:lstStyle/>
+          <a:p>
+            <a:pPr marL="0" indent="0">
+              <a:lnSpc>
+                <a:spcPct val="100000"/>
+              </a:lnSpc>
+              <a:buNone/>
+            </a:pPr>
+            <a:r>
+              <a:rPr lang="nl-NL" sz="3200" dirty="0" smtClean="0"/>
+              <a:t>De Driver</a:t>
+            </a:r>
+          </a:p>
+          <a:p>
+            <a:pPr marL="0" indent="0">
+              <a:lnSpc>
+                <a:spcPct val="100000"/>
+              </a:lnSpc>
+              <a:buNone/>
+            </a:pPr>
+            <a:endParaRPr lang="nl-NL" sz="2400" dirty="0" smtClean="0"/>
+          </a:p>
+          <a:p>
+            <a:pPr>
+              <a:lnSpc>
+                <a:spcPct val="100000"/>
+              </a:lnSpc>
+            </a:pPr>
+            <a:r>
+              <a:rPr lang="nl-NL" sz="2400" dirty="0" smtClean="0"/>
+              <a:t>Schrijft de code</a:t>
+            </a:r>
+            <a:br>
+              <a:rPr lang="nl-NL" sz="2400" dirty="0" smtClean="0"/>
+            </a:br>
+            <a:endParaRPr lang="nl-NL" sz="2400" dirty="0" smtClean="0"/>
+          </a:p>
+          <a:p>
+            <a:pPr>
+              <a:lnSpc>
+                <a:spcPct val="100000"/>
+              </a:lnSpc>
+            </a:pPr>
+            <a:r>
+              <a:rPr lang="nl-NL" sz="2400" dirty="0" smtClean="0"/>
+              <a:t>Luistert naar de navigator</a:t>
+            </a:r>
+            <a:br>
+              <a:rPr lang="nl-NL" sz="2400" dirty="0" smtClean="0"/>
+            </a:br>
+            <a:endParaRPr lang="nl-NL" sz="2400" dirty="0" smtClean="0"/>
+          </a:p>
+          <a:p>
+            <a:pPr>
+              <a:lnSpc>
+                <a:spcPct val="100000"/>
+              </a:lnSpc>
+            </a:pPr>
+            <a:r>
+              <a:rPr lang="nl-NL" sz="2400" dirty="0" smtClean="0"/>
+              <a:t>Verteld de navigator zijn ideeën (vertel wat je denkt)</a:t>
+            </a:r>
+            <a:br>
+              <a:rPr lang="nl-NL" sz="2400" dirty="0" smtClean="0"/>
+            </a:br>
+            <a:endParaRPr lang="nl-NL" sz="2400" dirty="0" smtClean="0"/>
+          </a:p>
+          <a:p>
+            <a:pPr>
+              <a:lnSpc>
+                <a:spcPct val="100000"/>
+              </a:lnSpc>
+            </a:pPr>
+            <a:r>
+              <a:rPr lang="nl-NL" sz="2400" dirty="0" smtClean="0"/>
+              <a:t>Reageer constructief op feedback van navigator</a:t>
+            </a:r>
+          </a:p>
+          <a:p>
+            <a:pPr marL="0" indent="0">
+              <a:lnSpc>
+                <a:spcPct val="100000"/>
+              </a:lnSpc>
+              <a:buNone/>
+            </a:pPr>
+            <a:endParaRPr lang="nl-NL" sz="2400" dirty="0" smtClean="0"/>
+          </a:p>
+          <a:p>
+            <a:pPr marL="0" indent="0">
+              <a:lnSpc>
+                <a:spcPct val="100000"/>
+              </a:lnSpc>
+              <a:buNone/>
+            </a:pPr>
+            <a:endParaRPr lang="nl-NL" sz="2400" dirty="0" smtClean="0"/>
+          </a:p>
+          <a:p>
+            <a:pPr>
+              <a:lnSpc>
+                <a:spcPct val="100000"/>
+              </a:lnSpc>
+            </a:pPr>
+            <a:endParaRPr lang="nl-NL" sz="2400" dirty="0" smtClean="0"/>
+          </a:p>
+          <a:p>
+            <a:pPr>
+              <a:lnSpc>
+                <a:spcPct val="100000"/>
+              </a:lnSpc>
+            </a:pPr>
+            <a:endParaRPr lang="nl-NL" sz="2000" dirty="0"/>
+          </a:p>
+          <a:p>
+            <a:pPr>
+              <a:lnSpc>
+                <a:spcPct val="100000"/>
+              </a:lnSpc>
+            </a:pPr>
+            <a:endParaRPr lang="nl-NL" sz="2000" dirty="0"/>
+          </a:p>
+          <a:p>
+            <a:pPr>
+              <a:lnSpc>
+                <a:spcPct val="100000"/>
+              </a:lnSpc>
+            </a:pPr>
+            <a:endParaRPr lang="nl-NL" sz="1600" dirty="0" smtClean="0"/>
+          </a:p>
+        </p:txBody>
+      </p:sp>
     </p:spTree>
     <p:extLst>
       <p:ext uri="{BB962C8B-B14F-4D97-AF65-F5344CB8AC3E}">
@@ -11113,7 +10837,79 @@
   <p:timing>
     <p:tnLst>
       <p:par>
-        <p:cTn id="1" dur="indefinite" restart="never" nodeType="tmRoot"/>
+        <p:cTn id="1" dur="indefinite" restart="never" nodeType="tmRoot">
+          <p:childTnLst>
+            <p:seq concurrent="1" nextAc="seek">
+              <p:cTn id="2" dur="indefinite" nodeType="mainSeq">
+                <p:childTnLst>
+                  <p:par>
+                    <p:cTn id="3" fill="hold">
+                      <p:stCondLst>
+                        <p:cond delay="indefinite"/>
+                      </p:stCondLst>
+                      <p:childTnLst>
+                        <p:par>
+                          <p:cTn id="4" fill="hold">
+                            <p:stCondLst>
+                              <p:cond delay="0"/>
+                            </p:stCondLst>
+                            <p:childTnLst>
+                              <p:par>
+                                <p:cTn id="5" presetID="9" presetClass="emph" presetSubtype="0" nodeType="clickEffect">
+                                  <p:stCondLst>
+                                    <p:cond delay="0"/>
+                                  </p:stCondLst>
+                                  <p:childTnLst>
+                                    <p:set>
+                                      <p:cBhvr rctx="PPT">
+                                        <p:cTn id="6" dur="indefinite"/>
+                                        <p:tgtEl>
+                                          <p:spTgt spid="3"/>
+                                        </p:tgtEl>
+                                        <p:attrNameLst>
+                                          <p:attrName>style.opacity</p:attrName>
+                                        </p:attrNameLst>
+                                      </p:cBhvr>
+                                      <p:to>
+                                        <p:strVal val="0.5"/>
+                                      </p:to>
+                                    </p:set>
+                                    <p:animEffect filter="image" prLst="opacity: 0.5">
+                                      <p:cBhvr rctx="IE">
+                                        <p:cTn id="7" dur="indefinite"/>
+                                        <p:tgtEl>
+                                          <p:spTgt spid="3"/>
+                                        </p:tgtEl>
+                                      </p:cBhvr>
+                                    </p:animEffect>
+                                  </p:childTnLst>
+                                </p:cTn>
+                              </p:par>
+                            </p:childTnLst>
+                          </p:cTn>
+                        </p:par>
+                      </p:childTnLst>
+                    </p:cTn>
+                  </p:par>
+                </p:childTnLst>
+              </p:cTn>
+              <p:prevCondLst>
+                <p:cond evt="onPrev" delay="0">
+                  <p:tgtEl>
+                    <p:sldTgt/>
+                  </p:tgtEl>
+                </p:cond>
+              </p:prevCondLst>
+              <p:nextCondLst>
+                <p:cond evt="onNext" delay="0">
+                  <p:tgtEl>
+                    <p:sldTgt/>
+                  </p:tgtEl>
+                </p:cond>
+              </p:nextCondLst>
+            </p:seq>
+          </p:childTnLst>
+        </p:cTn>
       </p:par>
     </p:tnLst>
   </p:timing>

</xml_diff>